<commit_message>
Mise à jour suite aux modifs de code
</commit_message>
<xml_diff>
--- a/Dev_uCOS-II/Oufff2012/Conception/Projet2012.pptx
+++ b/Dev_uCOS-II/Oufff2012/Conception/Projet2012.pptx
@@ -6,6 +6,7 @@
   </p:sldMasterIdLst>
   <p:sldIdLst>
     <p:sldId id="256" r:id="rId2"/>
+    <p:sldId id="257" r:id="rId3"/>
   </p:sldIdLst>
   <p:sldSz cx="9144000" cy="6858000" type="screen4x3"/>
   <p:notesSz cx="7099300" cy="10234613"/>
@@ -3619,7 +3620,7 @@
                         <a:tabLst/>
                       </a:pPr>
                       <a:r>
-                        <a:rPr kumimoji="0" lang="fr-FR" sz="1600" b="1" i="0" u="none" strike="noStrike" cap="none" normalizeH="0" baseline="0" smtClean="0">
+                        <a:rPr kumimoji="0" lang="fr-FR" sz="1600" b="1" i="0" u="none" strike="noStrike" cap="none" normalizeH="0" baseline="0" dirty="0" err="1" smtClean="0">
                           <a:ln>
                             <a:noFill/>
                           </a:ln>
@@ -3632,6 +3633,17 @@
                         </a:rPr>
                         <a:t>TaskMain</a:t>
                       </a:r>
+                      <a:endParaRPr kumimoji="0" lang="fr-FR" sz="1600" b="1" i="0" u="none" strike="noStrike" cap="none" normalizeH="0" baseline="0" dirty="0" smtClean="0">
+                        <a:ln>
+                          <a:noFill/>
+                        </a:ln>
+                        <a:solidFill>
+                          <a:schemeClr val="tx1"/>
+                        </a:solidFill>
+                        <a:effectLst/>
+                        <a:latin typeface="Calibri" pitchFamily="34" charset="0"/>
+                        <a:cs typeface="Arial" charset="0"/>
+                      </a:endParaRPr>
                     </a:p>
                   </a:txBody>
                   <a:tcPr horzOverflow="overflow">
@@ -3719,7 +3731,7 @@
                         <a:tabLst/>
                       </a:pPr>
                       <a:r>
-                        <a:rPr kumimoji="0" lang="fr-FR" sz="1200" b="0" i="0" u="none" strike="noStrike" cap="none" normalizeH="0" baseline="0" smtClean="0">
+                        <a:rPr kumimoji="0" lang="fr-FR" sz="1200" b="0" i="0" u="none" strike="noStrike" cap="none" normalizeH="0" baseline="0" dirty="0" smtClean="0">
                           <a:ln>
                             <a:noFill/>
                           </a:ln>
@@ -3730,8 +3742,61 @@
                           <a:latin typeface="Calibri" pitchFamily="34" charset="0"/>
                           <a:cs typeface="Arial" charset="0"/>
                         </a:rPr>
-                        <a:t> Synchronize all tasks</a:t>
-                      </a:r>
+                        <a:t> </a:t>
+                      </a:r>
+                      <a:r>
+                        <a:rPr kumimoji="0" lang="fr-FR" sz="1200" b="0" i="0" u="none" strike="noStrike" cap="none" normalizeH="0" baseline="0" dirty="0" err="1" smtClean="0">
+                          <a:ln>
+                            <a:noFill/>
+                          </a:ln>
+                          <a:solidFill>
+                            <a:schemeClr val="tx1"/>
+                          </a:solidFill>
+                          <a:effectLst/>
+                          <a:latin typeface="Calibri" pitchFamily="34" charset="0"/>
+                          <a:cs typeface="Arial" charset="0"/>
+                        </a:rPr>
+                        <a:t>Synchronize</a:t>
+                      </a:r>
+                      <a:r>
+                        <a:rPr kumimoji="0" lang="fr-FR" sz="1200" b="0" i="0" u="none" strike="noStrike" cap="none" normalizeH="0" baseline="0" dirty="0" smtClean="0">
+                          <a:ln>
+                            <a:noFill/>
+                          </a:ln>
+                          <a:solidFill>
+                            <a:schemeClr val="tx1"/>
+                          </a:solidFill>
+                          <a:effectLst/>
+                          <a:latin typeface="Calibri" pitchFamily="34" charset="0"/>
+                          <a:cs typeface="Arial" charset="0"/>
+                        </a:rPr>
+                        <a:t> all </a:t>
+                      </a:r>
+                      <a:r>
+                        <a:rPr kumimoji="0" lang="fr-FR" sz="1200" b="0" i="0" u="none" strike="noStrike" cap="none" normalizeH="0" baseline="0" dirty="0" err="1" smtClean="0">
+                          <a:ln>
+                            <a:noFill/>
+                          </a:ln>
+                          <a:solidFill>
+                            <a:schemeClr val="tx1"/>
+                          </a:solidFill>
+                          <a:effectLst/>
+                          <a:latin typeface="Calibri" pitchFamily="34" charset="0"/>
+                          <a:cs typeface="Arial" charset="0"/>
+                        </a:rPr>
+                        <a:t>tasks</a:t>
+                      </a:r>
+                      <a:endParaRPr kumimoji="0" lang="fr-FR" sz="1200" b="0" i="0" u="none" strike="noStrike" cap="none" normalizeH="0" baseline="0" dirty="0" smtClean="0">
+                        <a:ln>
+                          <a:noFill/>
+                        </a:ln>
+                        <a:solidFill>
+                          <a:schemeClr val="tx1"/>
+                        </a:solidFill>
+                        <a:effectLst/>
+                        <a:latin typeface="Calibri" pitchFamily="34" charset="0"/>
+                        <a:cs typeface="Arial" charset="0"/>
+                      </a:endParaRPr>
                     </a:p>
                   </a:txBody>
                   <a:tcPr horzOverflow="overflow">
@@ -4855,7 +4920,7 @@
                         <a:tabLst/>
                       </a:pPr>
                       <a:r>
-                        <a:rPr kumimoji="0" lang="fr-FR" sz="1200" b="0" i="0" u="none" strike="noStrike" cap="none" normalizeH="0" baseline="0" smtClean="0">
+                        <a:rPr kumimoji="0" lang="fr-FR" sz="1200" b="0" i="0" u="none" strike="noStrike" cap="none" normalizeH="0" baseline="0" dirty="0" smtClean="0">
                           <a:ln>
                             <a:noFill/>
                           </a:ln>
@@ -4866,8 +4931,145 @@
                           <a:latin typeface="Calibri" pitchFamily="34" charset="0"/>
                           <a:cs typeface="Arial" charset="0"/>
                         </a:rPr>
-                        <a:t>Queue used to send command from TaskMain to TaskSensor</a:t>
-                      </a:r>
+                        <a:t>Queue </a:t>
+                      </a:r>
+                      <a:r>
+                        <a:rPr kumimoji="0" lang="fr-FR" sz="1200" b="0" i="0" u="none" strike="noStrike" cap="none" normalizeH="0" baseline="0" dirty="0" err="1" smtClean="0">
+                          <a:ln>
+                            <a:noFill/>
+                          </a:ln>
+                          <a:solidFill>
+                            <a:schemeClr val="tx1"/>
+                          </a:solidFill>
+                          <a:effectLst/>
+                          <a:latin typeface="Calibri" pitchFamily="34" charset="0"/>
+                          <a:cs typeface="Arial" charset="0"/>
+                        </a:rPr>
+                        <a:t>used</a:t>
+                      </a:r>
+                      <a:r>
+                        <a:rPr kumimoji="0" lang="fr-FR" sz="1200" b="0" i="0" u="none" strike="noStrike" cap="none" normalizeH="0" baseline="0" dirty="0" smtClean="0">
+                          <a:ln>
+                            <a:noFill/>
+                          </a:ln>
+                          <a:solidFill>
+                            <a:schemeClr val="tx1"/>
+                          </a:solidFill>
+                          <a:effectLst/>
+                          <a:latin typeface="Calibri" pitchFamily="34" charset="0"/>
+                          <a:cs typeface="Arial" charset="0"/>
+                        </a:rPr>
+                        <a:t> to </a:t>
+                      </a:r>
+                      <a:r>
+                        <a:rPr kumimoji="0" lang="fr-FR" sz="1200" b="0" i="0" u="none" strike="noStrike" cap="none" normalizeH="0" baseline="0" dirty="0" err="1" smtClean="0">
+                          <a:ln>
+                            <a:noFill/>
+                          </a:ln>
+                          <a:solidFill>
+                            <a:schemeClr val="tx1"/>
+                          </a:solidFill>
+                          <a:effectLst/>
+                          <a:latin typeface="Calibri" pitchFamily="34" charset="0"/>
+                          <a:cs typeface="Arial" charset="0"/>
+                        </a:rPr>
+                        <a:t>send</a:t>
+                      </a:r>
+                      <a:r>
+                        <a:rPr kumimoji="0" lang="fr-FR" sz="1200" b="0" i="0" u="none" strike="noStrike" cap="none" normalizeH="0" baseline="0" dirty="0" smtClean="0">
+                          <a:ln>
+                            <a:noFill/>
+                          </a:ln>
+                          <a:solidFill>
+                            <a:schemeClr val="tx1"/>
+                          </a:solidFill>
+                          <a:effectLst/>
+                          <a:latin typeface="Calibri" pitchFamily="34" charset="0"/>
+                          <a:cs typeface="Arial" charset="0"/>
+                        </a:rPr>
+                        <a:t> command </a:t>
+                      </a:r>
+                      <a:r>
+                        <a:rPr kumimoji="0" lang="fr-FR" sz="1200" b="0" i="0" u="none" strike="noStrike" cap="none" normalizeH="0" baseline="0" dirty="0" err="1" smtClean="0">
+                          <a:ln>
+                            <a:noFill/>
+                          </a:ln>
+                          <a:solidFill>
+                            <a:schemeClr val="tx1"/>
+                          </a:solidFill>
+                          <a:effectLst/>
+                          <a:latin typeface="Calibri" pitchFamily="34" charset="0"/>
+                          <a:cs typeface="Arial" charset="0"/>
+                        </a:rPr>
+                        <a:t>from</a:t>
+                      </a:r>
+                      <a:r>
+                        <a:rPr kumimoji="0" lang="fr-FR" sz="1200" b="0" i="0" u="none" strike="noStrike" cap="none" normalizeH="0" baseline="0" dirty="0" smtClean="0">
+                          <a:ln>
+                            <a:noFill/>
+                          </a:ln>
+                          <a:solidFill>
+                            <a:schemeClr val="tx1"/>
+                          </a:solidFill>
+                          <a:effectLst/>
+                          <a:latin typeface="Calibri" pitchFamily="34" charset="0"/>
+                          <a:cs typeface="Arial" charset="0"/>
+                        </a:rPr>
+                        <a:t> </a:t>
+                      </a:r>
+                      <a:r>
+                        <a:rPr kumimoji="0" lang="fr-FR" sz="1200" b="0" i="0" u="none" strike="noStrike" cap="none" normalizeH="0" baseline="0" dirty="0" err="1" smtClean="0">
+                          <a:ln>
+                            <a:noFill/>
+                          </a:ln>
+                          <a:solidFill>
+                            <a:schemeClr val="tx1"/>
+                          </a:solidFill>
+                          <a:effectLst/>
+                          <a:latin typeface="Calibri" pitchFamily="34" charset="0"/>
+                          <a:cs typeface="Arial" charset="0"/>
+                        </a:rPr>
+                        <a:t>TaskMain</a:t>
+                      </a:r>
+                      <a:r>
+                        <a:rPr kumimoji="0" lang="fr-FR" sz="1200" b="0" i="0" u="none" strike="noStrike" cap="none" normalizeH="0" baseline="0" dirty="0" smtClean="0">
+                          <a:ln>
+                            <a:noFill/>
+                          </a:ln>
+                          <a:solidFill>
+                            <a:schemeClr val="tx1"/>
+                          </a:solidFill>
+                          <a:effectLst/>
+                          <a:latin typeface="Calibri" pitchFamily="34" charset="0"/>
+                          <a:cs typeface="Arial" charset="0"/>
+                        </a:rPr>
+                        <a:t> to </a:t>
+                      </a:r>
+                      <a:r>
+                        <a:rPr kumimoji="0" lang="fr-FR" sz="1200" b="0" i="0" u="none" strike="noStrike" cap="none" normalizeH="0" baseline="0" dirty="0" err="1" smtClean="0">
+                          <a:ln>
+                            <a:noFill/>
+                          </a:ln>
+                          <a:solidFill>
+                            <a:schemeClr val="tx1"/>
+                          </a:solidFill>
+                          <a:effectLst/>
+                          <a:latin typeface="Calibri" pitchFamily="34" charset="0"/>
+                          <a:cs typeface="Arial" charset="0"/>
+                        </a:rPr>
+                        <a:t>TaskSensor</a:t>
+                      </a:r>
+                      <a:endParaRPr kumimoji="0" lang="fr-FR" sz="1200" b="0" i="0" u="none" strike="noStrike" cap="none" normalizeH="0" baseline="0" dirty="0" smtClean="0">
+                        <a:ln>
+                          <a:noFill/>
+                        </a:ln>
+                        <a:solidFill>
+                          <a:schemeClr val="tx1"/>
+                        </a:solidFill>
+                        <a:effectLst/>
+                        <a:latin typeface="Calibri" pitchFamily="34" charset="0"/>
+                        <a:cs typeface="Arial" charset="0"/>
+                      </a:endParaRPr>
                     </a:p>
                     <a:p>
                       <a:pPr marL="0" marR="0" lvl="0" indent="0" algn="ctr" defTabSz="914400" rtl="0" eaLnBrk="1" fontAlgn="base" latinLnBrk="0" hangingPunct="1">
@@ -4887,7 +5089,7 @@
                         <a:tabLst/>
                       </a:pPr>
                       <a:r>
-                        <a:rPr kumimoji="0" lang="fr-FR" sz="1200" b="0" i="0" u="none" strike="noStrike" cap="none" normalizeH="0" baseline="0" smtClean="0">
+                        <a:rPr kumimoji="0" lang="fr-FR" sz="1200" b="0" i="0" u="none" strike="noStrike" cap="none" normalizeH="0" baseline="0" dirty="0" smtClean="0">
                           <a:ln>
                             <a:noFill/>
                           </a:ln>
@@ -4898,7 +5100,63 @@
                           <a:latin typeface="Calibri" pitchFamily="34" charset="0"/>
                           <a:cs typeface="Arial" charset="0"/>
                         </a:rPr>
-                        <a:t> Results are sent by using ACTION_STATUS Flag</a:t>
+                        <a:t> </a:t>
+                      </a:r>
+                      <a:r>
+                        <a:rPr kumimoji="0" lang="fr-FR" sz="1200" b="0" i="0" u="none" strike="noStrike" cap="none" normalizeH="0" baseline="0" dirty="0" err="1" smtClean="0">
+                          <a:ln>
+                            <a:noFill/>
+                          </a:ln>
+                          <a:solidFill>
+                            <a:schemeClr val="tx1"/>
+                          </a:solidFill>
+                          <a:effectLst/>
+                          <a:latin typeface="Calibri" pitchFamily="34" charset="0"/>
+                          <a:cs typeface="Arial" charset="0"/>
+                        </a:rPr>
+                        <a:t>Results</a:t>
+                      </a:r>
+                      <a:r>
+                        <a:rPr kumimoji="0" lang="fr-FR" sz="1200" b="0" i="0" u="none" strike="noStrike" cap="none" normalizeH="0" baseline="0" dirty="0" smtClean="0">
+                          <a:ln>
+                            <a:noFill/>
+                          </a:ln>
+                          <a:solidFill>
+                            <a:schemeClr val="tx1"/>
+                          </a:solidFill>
+                          <a:effectLst/>
+                          <a:latin typeface="Calibri" pitchFamily="34" charset="0"/>
+                          <a:cs typeface="Arial" charset="0"/>
+                        </a:rPr>
+                        <a:t> are sent by </a:t>
+                      </a:r>
+                      <a:r>
+                        <a:rPr kumimoji="0" lang="fr-FR" sz="1200" b="0" i="0" u="none" strike="noStrike" cap="none" normalizeH="0" baseline="0" dirty="0" err="1" smtClean="0">
+                          <a:ln>
+                            <a:noFill/>
+                          </a:ln>
+                          <a:solidFill>
+                            <a:schemeClr val="tx1"/>
+                          </a:solidFill>
+                          <a:effectLst/>
+                          <a:latin typeface="Calibri" pitchFamily="34" charset="0"/>
+                          <a:cs typeface="Arial" charset="0"/>
+                        </a:rPr>
+                        <a:t>using</a:t>
+                      </a:r>
+                      <a:r>
+                        <a:rPr kumimoji="0" lang="fr-FR" sz="1200" b="0" i="0" u="none" strike="noStrike" cap="none" normalizeH="0" baseline="0" dirty="0" smtClean="0">
+                          <a:ln>
+                            <a:noFill/>
+                          </a:ln>
+                          <a:solidFill>
+                            <a:schemeClr val="tx1"/>
+                          </a:solidFill>
+                          <a:effectLst/>
+                          <a:latin typeface="Calibri" pitchFamily="34" charset="0"/>
+                          <a:cs typeface="Arial" charset="0"/>
+                        </a:rPr>
+                        <a:t> ACTION_STATUS Flag</a:t>
                       </a:r>
                     </a:p>
                   </a:txBody>
@@ -4959,7 +5217,13 @@
           <p:cNvGraphicFramePr>
             <a:graphicFrameLocks noGrp="1"/>
           </p:cNvGraphicFramePr>
-          <p:nvPr/>
+          <p:nvPr>
+            <p:extLst>
+              <p:ext uri="{D42A27DB-BD31-4B8C-83A1-F6EECF244321}">
+                <p14:modId xmlns:p14="http://schemas.microsoft.com/office/powerpoint/2010/main" val="1230071322"/>
+              </p:ext>
+            </p:extLst>
+          </p:nvPr>
         </p:nvGraphicFramePr>
         <p:xfrm>
           <a:off x="2916238" y="4868863"/>
@@ -5009,7 +5273,21 @@
                           <a:latin typeface="Calibri" pitchFamily="34" charset="0"/>
                           <a:cs typeface="Arial" charset="0"/>
                         </a:rPr>
-                        <a:t>Flags (32 bits)</a:t>
+                        <a:t>App Flags </a:t>
+                      </a:r>
+                      <a:r>
+                        <a:rPr kumimoji="0" lang="fr-FR" sz="1600" b="1" i="0" u="none" strike="noStrike" cap="none" normalizeH="0" baseline="0" dirty="0" smtClean="0">
+                          <a:ln>
+                            <a:noFill/>
+                          </a:ln>
+                          <a:solidFill>
+                            <a:schemeClr val="tx1"/>
+                          </a:solidFill>
+                          <a:effectLst/>
+                          <a:latin typeface="Calibri" pitchFamily="34" charset="0"/>
+                          <a:cs typeface="Arial" charset="0"/>
+                        </a:rPr>
+                        <a:t>(32 bits)</a:t>
                       </a:r>
                     </a:p>
                   </a:txBody>
@@ -6696,14 +6974,12 @@
           <p:cNvPr id="22" name="Connecteur droit avec flèche 21"/>
           <p:cNvCxnSpPr>
             <a:cxnSpLocks noChangeShapeType="1"/>
-            <a:stCxn id="0" idx="0"/>
-            <a:endCxn id="0" idx="2"/>
           </p:cNvCxnSpPr>
           <p:nvPr/>
         </p:nvCxnSpPr>
         <p:spPr bwMode="auto">
           <a:xfrm flipV="1">
-            <a:off x="5795963" y="2520950"/>
+            <a:off x="6228184" y="2520950"/>
             <a:ext cx="1587" cy="2347913"/>
           </a:xfrm>
           <a:prstGeom prst="straightConnector1">
@@ -6940,13 +7216,22 @@
           <a:p>
             <a:pPr algn="ctr"/>
             <a:r>
-              <a:rPr lang="fr-FR" sz="1000" b="1">
+              <a:rPr lang="fr-FR" sz="1000" b="1" dirty="0" err="1">
                 <a:solidFill>
                   <a:srgbClr val="31859C"/>
                 </a:solidFill>
                 <a:cs typeface="Arial" charset="0"/>
               </a:rPr>
-              <a:t>StructCmd </a:t>
+              <a:t>StructCmd</a:t>
+            </a:r>
+            <a:r>
+              <a:rPr lang="fr-FR" sz="1000" b="1" dirty="0">
+                <a:solidFill>
+                  <a:srgbClr val="31859C"/>
+                </a:solidFill>
+                <a:cs typeface="Arial" charset="0"/>
+              </a:rPr>
+              <a:t> </a:t>
             </a:r>
             <a:r>
               <a:rPr lang="fr-FR" sz="1000" b="1" noProof="1">
@@ -6957,7 +7242,7 @@
               </a:rPr>
               <a:t>App_CmdToTaskMvt</a:t>
             </a:r>
-            <a:endParaRPr lang="fr-FR" sz="1000" b="1">
+            <a:endParaRPr lang="fr-FR" sz="1000" b="1" dirty="0">
               <a:solidFill>
                 <a:srgbClr val="31859C"/>
               </a:solidFill>
@@ -7394,7 +7679,2337 @@
           </a:graphicData>
         </a:graphic>
       </p:graphicFrame>
+      <p:cxnSp>
+        <p:nvCxnSpPr>
+          <p:cNvPr id="31" name="Connecteur droit avec flèche 30"/>
+          <p:cNvCxnSpPr>
+            <a:cxnSpLocks noChangeShapeType="1"/>
+          </p:cNvCxnSpPr>
+          <p:nvPr/>
+        </p:nvCxnSpPr>
+        <p:spPr bwMode="auto">
+          <a:xfrm flipV="1">
+            <a:off x="5580112" y="2520951"/>
+            <a:ext cx="0" cy="1556121"/>
+          </a:xfrm>
+          <a:prstGeom prst="straightConnector1">
+            <a:avLst/>
+          </a:prstGeom>
+          <a:noFill/>
+          <a:ln w="38100" algn="ctr">
+            <a:solidFill>
+              <a:schemeClr val="accent2"/>
+            </a:solidFill>
+            <a:round/>
+            <a:headEnd/>
+            <a:tailEnd type="arrow" w="med" len="med"/>
+          </a:ln>
+          <a:effectLst>
+            <a:outerShdw dist="23000" dir="5400000" rotWithShape="0">
+              <a:srgbClr val="000000">
+                <a:alpha val="34999"/>
+              </a:srgbClr>
+            </a:outerShdw>
+          </a:effectLst>
+        </p:spPr>
+      </p:cxnSp>
+      <p:graphicFrame>
+        <p:nvGraphicFramePr>
+          <p:cNvPr id="33" name="Group 96"/>
+          <p:cNvGraphicFramePr>
+            <a:graphicFrameLocks noGrp="1"/>
+          </p:cNvGraphicFramePr>
+          <p:nvPr>
+            <p:extLst>
+              <p:ext uri="{D42A27DB-BD31-4B8C-83A1-F6EECF244321}">
+                <p14:modId xmlns:p14="http://schemas.microsoft.com/office/powerpoint/2010/main" val="3629319386"/>
+              </p:ext>
+            </p:extLst>
+          </p:nvPr>
+        </p:nvGraphicFramePr>
+        <p:xfrm>
+          <a:off x="3851920" y="4077072"/>
+          <a:ext cx="2088232" cy="645078"/>
+        </p:xfrm>
+        <a:graphic>
+          <a:graphicData uri="http://schemas.openxmlformats.org/drawingml/2006/table">
+            <a:tbl>
+              <a:tblPr/>
+              <a:tblGrid>
+                <a:gridCol w="2088232"/>
+              </a:tblGrid>
+              <a:tr h="266265">
+                <a:tc>
+                  <a:txBody>
+                    <a:bodyPr/>
+                    <a:lstStyle/>
+                    <a:p>
+                      <a:pPr marL="0" marR="0" lvl="0" indent="0" algn="ctr" defTabSz="914400" rtl="0" eaLnBrk="1" fontAlgn="base" latinLnBrk="0" hangingPunct="1">
+                        <a:lnSpc>
+                          <a:spcPct val="100000"/>
+                        </a:lnSpc>
+                        <a:spcBef>
+                          <a:spcPct val="0"/>
+                        </a:spcBef>
+                        <a:spcAft>
+                          <a:spcPct val="0"/>
+                        </a:spcAft>
+                        <a:buClrTx/>
+                        <a:buSzTx/>
+                        <a:buFontTx/>
+                        <a:buNone/>
+                        <a:tabLst/>
+                      </a:pPr>
+                      <a:r>
+                        <a:rPr kumimoji="0" lang="fr-FR" sz="1600" b="1" i="0" u="none" strike="noStrike" cap="none" normalizeH="0" baseline="0" dirty="0" err="1" smtClean="0">
+                          <a:ln>
+                            <a:noFill/>
+                          </a:ln>
+                          <a:solidFill>
+                            <a:schemeClr val="tx1"/>
+                          </a:solidFill>
+                          <a:effectLst/>
+                          <a:latin typeface="Calibri" pitchFamily="34" charset="0"/>
+                          <a:cs typeface="Arial" charset="0"/>
+                        </a:rPr>
+                        <a:t>Strategy</a:t>
+                      </a:r>
+                      <a:r>
+                        <a:rPr kumimoji="0" lang="fr-FR" sz="1600" b="1" i="0" u="none" strike="noStrike" cap="none" normalizeH="0" baseline="0" dirty="0" smtClean="0">
+                          <a:ln>
+                            <a:noFill/>
+                          </a:ln>
+                          <a:solidFill>
+                            <a:schemeClr val="tx1"/>
+                          </a:solidFill>
+                          <a:effectLst/>
+                          <a:latin typeface="Calibri" pitchFamily="34" charset="0"/>
+                          <a:cs typeface="Arial" charset="0"/>
+                        </a:rPr>
+                        <a:t> Flags </a:t>
+                      </a:r>
+                      <a:r>
+                        <a:rPr kumimoji="0" lang="fr-FR" sz="1600" b="1" i="0" u="none" strike="noStrike" cap="none" normalizeH="0" baseline="0" dirty="0" smtClean="0">
+                          <a:ln>
+                            <a:noFill/>
+                          </a:ln>
+                          <a:solidFill>
+                            <a:schemeClr val="tx1"/>
+                          </a:solidFill>
+                          <a:effectLst/>
+                          <a:latin typeface="Calibri" pitchFamily="34" charset="0"/>
+                          <a:cs typeface="Arial" charset="0"/>
+                        </a:rPr>
+                        <a:t>(32 bits)</a:t>
+                      </a:r>
+                    </a:p>
+                  </a:txBody>
+                  <a:tcPr horzOverflow="overflow">
+                    <a:lnL w="12700" cap="flat" cmpd="sng" algn="ctr">
+                      <a:solidFill>
+                        <a:schemeClr val="tx1"/>
+                      </a:solidFill>
+                      <a:prstDash val="solid"/>
+                      <a:round/>
+                      <a:headEnd type="none" w="med" len="med"/>
+                      <a:tailEnd type="none" w="med" len="med"/>
+                    </a:lnL>
+                    <a:lnR w="12700" cap="flat" cmpd="sng" algn="ctr">
+                      <a:solidFill>
+                        <a:schemeClr val="tx1"/>
+                      </a:solidFill>
+                      <a:prstDash val="solid"/>
+                      <a:round/>
+                      <a:headEnd type="none" w="med" len="med"/>
+                      <a:tailEnd type="none" w="med" len="med"/>
+                    </a:lnR>
+                    <a:lnT w="12700" cap="flat" cmpd="sng" algn="ctr">
+                      <a:solidFill>
+                        <a:schemeClr val="tx1"/>
+                      </a:solidFill>
+                      <a:prstDash val="solid"/>
+                      <a:round/>
+                      <a:headEnd type="none" w="med" len="med"/>
+                      <a:tailEnd type="none" w="med" len="med"/>
+                    </a:lnT>
+                    <a:lnB w="12700" cap="flat" cmpd="sng" algn="ctr">
+                      <a:solidFill>
+                        <a:schemeClr val="tx1"/>
+                      </a:solidFill>
+                      <a:prstDash val="solid"/>
+                      <a:round/>
+                      <a:headEnd type="none" w="med" len="med"/>
+                      <a:tailEnd type="none" w="med" len="med"/>
+                    </a:lnB>
+                    <a:lnTlToBr>
+                      <a:noFill/>
+                    </a:lnTlToBr>
+                    <a:lnBlToTr>
+                      <a:noFill/>
+                    </a:lnBlToTr>
+                    <a:gradFill rotWithShape="1">
+                      <a:gsLst>
+                        <a:gs pos="0">
+                          <a:srgbClr val="FF8080"/>
+                        </a:gs>
+                        <a:gs pos="50000">
+                          <a:srgbClr val="FFB3B3"/>
+                        </a:gs>
+                        <a:gs pos="100000">
+                          <a:srgbClr val="FFDADA"/>
+                        </a:gs>
+                      </a:gsLst>
+                      <a:path path="rect">
+                        <a:fillToRect l="50000" t="50000" r="50000" b="50000"/>
+                      </a:path>
+                    </a:gradFill>
+                  </a:tcPr>
+                </a:tc>
+              </a:tr>
+              <a:tr h="309798">
+                <a:tc>
+                  <a:txBody>
+                    <a:bodyPr/>
+                    <a:lstStyle/>
+                    <a:p>
+                      <a:pPr marL="0" marR="0" lvl="0" indent="0" algn="ctr" defTabSz="914400" rtl="0" eaLnBrk="1" fontAlgn="base" latinLnBrk="0" hangingPunct="1">
+                        <a:lnSpc>
+                          <a:spcPct val="100000"/>
+                        </a:lnSpc>
+                        <a:spcBef>
+                          <a:spcPct val="0"/>
+                        </a:spcBef>
+                        <a:spcAft>
+                          <a:spcPct val="0"/>
+                        </a:spcAft>
+                        <a:buClrTx/>
+                        <a:buSzTx/>
+                        <a:buFontTx/>
+                        <a:buNone/>
+                        <a:tabLst/>
+                      </a:pPr>
+                      <a:r>
+                        <a:rPr kumimoji="0" lang="fr-FR" sz="1200" b="0" i="0" u="none" strike="noStrike" cap="none" normalizeH="0" baseline="0" dirty="0" err="1" smtClean="0">
+                          <a:ln>
+                            <a:noFill/>
+                          </a:ln>
+                          <a:solidFill>
+                            <a:schemeClr val="tx1"/>
+                          </a:solidFill>
+                          <a:effectLst/>
+                          <a:latin typeface="Calibri" pitchFamily="34" charset="0"/>
+                          <a:cs typeface="Arial" charset="0"/>
+                        </a:rPr>
+                        <a:t>See</a:t>
+                      </a:r>
+                      <a:r>
+                        <a:rPr kumimoji="0" lang="fr-FR" sz="1200" b="0" i="0" u="none" strike="noStrike" cap="none" normalizeH="0" baseline="0" dirty="0" smtClean="0">
+                          <a:ln>
+                            <a:noFill/>
+                          </a:ln>
+                          <a:solidFill>
+                            <a:schemeClr val="tx1"/>
+                          </a:solidFill>
+                          <a:effectLst/>
+                          <a:latin typeface="Calibri" pitchFamily="34" charset="0"/>
+                          <a:cs typeface="Arial" charset="0"/>
+                        </a:rPr>
+                        <a:t> Page 2</a:t>
+                      </a:r>
+                      <a:endParaRPr kumimoji="0" lang="fr-FR" sz="1200" b="0" i="0" u="none" strike="noStrike" cap="none" normalizeH="0" baseline="0" dirty="0" smtClean="0">
+                        <a:ln>
+                          <a:noFill/>
+                        </a:ln>
+                        <a:solidFill>
+                          <a:schemeClr val="tx1"/>
+                        </a:solidFill>
+                        <a:effectLst/>
+                        <a:latin typeface="Calibri" pitchFamily="34" charset="0"/>
+                        <a:cs typeface="Arial" charset="0"/>
+                      </a:endParaRPr>
+                    </a:p>
+                  </a:txBody>
+                  <a:tcPr horzOverflow="overflow">
+                    <a:lnL w="12700" cap="flat" cmpd="sng" algn="ctr">
+                      <a:solidFill>
+                        <a:schemeClr val="tx1"/>
+                      </a:solidFill>
+                      <a:prstDash val="solid"/>
+                      <a:round/>
+                      <a:headEnd type="none" w="med" len="med"/>
+                      <a:tailEnd type="none" w="med" len="med"/>
+                    </a:lnL>
+                    <a:lnR w="12700" cap="flat" cmpd="sng" algn="ctr">
+                      <a:solidFill>
+                        <a:schemeClr val="tx1"/>
+                      </a:solidFill>
+                      <a:prstDash val="solid"/>
+                      <a:round/>
+                      <a:headEnd type="none" w="med" len="med"/>
+                      <a:tailEnd type="none" w="med" len="med"/>
+                    </a:lnR>
+                    <a:lnT w="12700" cap="flat" cmpd="sng" algn="ctr">
+                      <a:solidFill>
+                        <a:schemeClr val="tx1"/>
+                      </a:solidFill>
+                      <a:prstDash val="solid"/>
+                      <a:round/>
+                      <a:headEnd type="none" w="med" len="med"/>
+                      <a:tailEnd type="none" w="med" len="med"/>
+                    </a:lnT>
+                    <a:lnB w="12700" cap="flat" cmpd="sng" algn="ctr">
+                      <a:solidFill>
+                        <a:schemeClr val="tx1"/>
+                      </a:solidFill>
+                      <a:prstDash val="solid"/>
+                      <a:round/>
+                      <a:headEnd type="none" w="med" len="med"/>
+                      <a:tailEnd type="none" w="med" len="med"/>
+                    </a:lnB>
+                    <a:lnTlToBr>
+                      <a:noFill/>
+                    </a:lnTlToBr>
+                    <a:lnBlToTr>
+                      <a:noFill/>
+                    </a:lnBlToTr>
+                    <a:noFill/>
+                  </a:tcPr>
+                </a:tc>
+              </a:tr>
+            </a:tbl>
+          </a:graphicData>
+        </a:graphic>
+      </p:graphicFrame>
     </p:spTree>
+  </p:cSld>
+  <p:clrMapOvr>
+    <a:masterClrMapping/>
+  </p:clrMapOvr>
+  <p:timing>
+    <p:tnLst>
+      <p:par>
+        <p:cTn id="1" dur="indefinite" restart="never" nodeType="tmRoot"/>
+      </p:par>
+    </p:tnLst>
+  </p:timing>
+</p:sld>
+</file>
+
+<file path=ppt/slides/slide2.xml><?xml version="1.0" encoding="utf-8"?>
+<p:sld xmlns:a="http://schemas.openxmlformats.org/drawingml/2006/main" xmlns:r="http://schemas.openxmlformats.org/officeDocument/2006/relationships" xmlns:p="http://schemas.openxmlformats.org/presentationml/2006/main">
+  <p:cSld>
+    <p:spTree>
+      <p:nvGrpSpPr>
+        <p:cNvPr id="1" name=""/>
+        <p:cNvGrpSpPr/>
+        <p:nvPr/>
+      </p:nvGrpSpPr>
+      <p:grpSpPr>
+        <a:xfrm>
+          <a:off x="0" y="0"/>
+          <a:ext cx="0" cy="0"/>
+          <a:chOff x="0" y="0"/>
+          <a:chExt cx="0" cy="0"/>
+        </a:xfrm>
+      </p:grpSpPr>
+      <p:graphicFrame>
+        <p:nvGraphicFramePr>
+          <p:cNvPr id="4" name="Group 96"/>
+          <p:cNvGraphicFramePr>
+            <a:graphicFrameLocks noGrp="1"/>
+          </p:cNvGraphicFramePr>
+          <p:nvPr>
+            <p:extLst>
+              <p:ext uri="{D42A27DB-BD31-4B8C-83A1-F6EECF244321}">
+                <p14:modId xmlns:p14="http://schemas.microsoft.com/office/powerpoint/2010/main" val="3645191909"/>
+              </p:ext>
+            </p:extLst>
+          </p:nvPr>
+        </p:nvGraphicFramePr>
+        <p:xfrm>
+          <a:off x="1763688" y="692696"/>
+          <a:ext cx="5759450" cy="1706880"/>
+        </p:xfrm>
+        <a:graphic>
+          <a:graphicData uri="http://schemas.openxmlformats.org/drawingml/2006/table">
+            <a:tbl>
+              <a:tblPr/>
+              <a:tblGrid>
+                <a:gridCol w="1439862"/>
+                <a:gridCol w="1439863"/>
+                <a:gridCol w="1439862"/>
+                <a:gridCol w="1439863"/>
+              </a:tblGrid>
+              <a:tr h="250825">
+                <a:tc gridSpan="4">
+                  <a:txBody>
+                    <a:bodyPr/>
+                    <a:lstStyle/>
+                    <a:p>
+                      <a:pPr marL="0" marR="0" lvl="0" indent="0" algn="ctr" defTabSz="914400" rtl="0" eaLnBrk="1" fontAlgn="base" latinLnBrk="0" hangingPunct="1">
+                        <a:lnSpc>
+                          <a:spcPct val="100000"/>
+                        </a:lnSpc>
+                        <a:spcBef>
+                          <a:spcPct val="0"/>
+                        </a:spcBef>
+                        <a:spcAft>
+                          <a:spcPct val="0"/>
+                        </a:spcAft>
+                        <a:buClrTx/>
+                        <a:buSzTx/>
+                        <a:buFontTx/>
+                        <a:buNone/>
+                        <a:tabLst/>
+                      </a:pPr>
+                      <a:r>
+                        <a:rPr kumimoji="0" lang="fr-FR" sz="1600" b="1" i="0" u="none" strike="noStrike" cap="none" normalizeH="0" baseline="0" dirty="0" err="1" smtClean="0">
+                          <a:ln>
+                            <a:noFill/>
+                          </a:ln>
+                          <a:solidFill>
+                            <a:schemeClr val="tx1"/>
+                          </a:solidFill>
+                          <a:effectLst/>
+                          <a:latin typeface="Calibri" pitchFamily="34" charset="0"/>
+                          <a:cs typeface="Arial" charset="0"/>
+                        </a:rPr>
+                        <a:t>Strategy</a:t>
+                      </a:r>
+                      <a:r>
+                        <a:rPr kumimoji="0" lang="fr-FR" sz="1600" b="1" i="0" u="none" strike="noStrike" cap="none" normalizeH="0" baseline="0" dirty="0" smtClean="0">
+                          <a:ln>
+                            <a:noFill/>
+                          </a:ln>
+                          <a:solidFill>
+                            <a:schemeClr val="tx1"/>
+                          </a:solidFill>
+                          <a:effectLst/>
+                          <a:latin typeface="Calibri" pitchFamily="34" charset="0"/>
+                          <a:cs typeface="Arial" charset="0"/>
+                        </a:rPr>
+                        <a:t> Flags </a:t>
+                      </a:r>
+                      <a:r>
+                        <a:rPr kumimoji="0" lang="fr-FR" sz="1600" b="1" i="0" u="none" strike="noStrike" cap="none" normalizeH="0" baseline="0" dirty="0" smtClean="0">
+                          <a:ln>
+                            <a:noFill/>
+                          </a:ln>
+                          <a:solidFill>
+                            <a:schemeClr val="tx1"/>
+                          </a:solidFill>
+                          <a:effectLst/>
+                          <a:latin typeface="Calibri" pitchFamily="34" charset="0"/>
+                          <a:cs typeface="Arial" charset="0"/>
+                        </a:rPr>
+                        <a:t>(32 bits)</a:t>
+                      </a:r>
+                    </a:p>
+                  </a:txBody>
+                  <a:tcPr horzOverflow="overflow">
+                    <a:lnL w="12700" cap="flat" cmpd="sng" algn="ctr">
+                      <a:solidFill>
+                        <a:schemeClr val="tx1"/>
+                      </a:solidFill>
+                      <a:prstDash val="solid"/>
+                      <a:round/>
+                      <a:headEnd type="none" w="med" len="med"/>
+                      <a:tailEnd type="none" w="med" len="med"/>
+                    </a:lnL>
+                    <a:lnR w="12700" cap="flat" cmpd="sng" algn="ctr">
+                      <a:solidFill>
+                        <a:schemeClr val="tx1"/>
+                      </a:solidFill>
+                      <a:prstDash val="solid"/>
+                      <a:round/>
+                      <a:headEnd type="none" w="med" len="med"/>
+                      <a:tailEnd type="none" w="med" len="med"/>
+                    </a:lnR>
+                    <a:lnT w="12700" cap="flat" cmpd="sng" algn="ctr">
+                      <a:solidFill>
+                        <a:schemeClr val="tx1"/>
+                      </a:solidFill>
+                      <a:prstDash val="solid"/>
+                      <a:round/>
+                      <a:headEnd type="none" w="med" len="med"/>
+                      <a:tailEnd type="none" w="med" len="med"/>
+                    </a:lnT>
+                    <a:lnB w="12700" cap="flat" cmpd="sng" algn="ctr">
+                      <a:solidFill>
+                        <a:schemeClr val="tx1"/>
+                      </a:solidFill>
+                      <a:prstDash val="solid"/>
+                      <a:round/>
+                      <a:headEnd type="none" w="med" len="med"/>
+                      <a:tailEnd type="none" w="med" len="med"/>
+                    </a:lnB>
+                    <a:lnTlToBr>
+                      <a:noFill/>
+                    </a:lnTlToBr>
+                    <a:lnBlToTr>
+                      <a:noFill/>
+                    </a:lnBlToTr>
+                    <a:gradFill rotWithShape="1">
+                      <a:gsLst>
+                        <a:gs pos="0">
+                          <a:srgbClr val="FF8080"/>
+                        </a:gs>
+                        <a:gs pos="50000">
+                          <a:srgbClr val="FFB3B3"/>
+                        </a:gs>
+                        <a:gs pos="100000">
+                          <a:srgbClr val="FFDADA"/>
+                        </a:gs>
+                      </a:gsLst>
+                      <a:path path="rect">
+                        <a:fillToRect l="50000" t="50000" r="50000" b="50000"/>
+                      </a:path>
+                    </a:gradFill>
+                  </a:tcPr>
+                </a:tc>
+                <a:tc hMerge="1">
+                  <a:txBody>
+                    <a:bodyPr/>
+                    <a:lstStyle/>
+                    <a:p>
+                      <a:endParaRPr lang="fr-FR"/>
+                    </a:p>
+                  </a:txBody>
+                  <a:tcPr/>
+                </a:tc>
+                <a:tc hMerge="1">
+                  <a:txBody>
+                    <a:bodyPr/>
+                    <a:lstStyle/>
+                    <a:p>
+                      <a:endParaRPr lang="fr-FR"/>
+                    </a:p>
+                  </a:txBody>
+                  <a:tcPr/>
+                </a:tc>
+                <a:tc hMerge="1">
+                  <a:txBody>
+                    <a:bodyPr/>
+                    <a:lstStyle/>
+                    <a:p>
+                      <a:endParaRPr lang="fr-FR"/>
+                    </a:p>
+                  </a:txBody>
+                  <a:tcPr/>
+                </a:tc>
+              </a:tr>
+              <a:tr h="1204913">
+                <a:tc>
+                  <a:txBody>
+                    <a:bodyPr/>
+                    <a:lstStyle/>
+                    <a:p>
+                      <a:pPr marL="0" marR="0" lvl="0" indent="0" algn="ctr" defTabSz="914400" rtl="0" eaLnBrk="1" fontAlgn="base" latinLnBrk="0" hangingPunct="1">
+                        <a:lnSpc>
+                          <a:spcPct val="100000"/>
+                        </a:lnSpc>
+                        <a:spcBef>
+                          <a:spcPct val="0"/>
+                        </a:spcBef>
+                        <a:spcAft>
+                          <a:spcPct val="0"/>
+                        </a:spcAft>
+                        <a:buClrTx/>
+                        <a:buSzTx/>
+                        <a:buFontTx/>
+                        <a:buNone/>
+                        <a:tabLst/>
+                      </a:pPr>
+                      <a:r>
+                        <a:rPr kumimoji="0" lang="fr-FR" sz="1200" b="1" i="0" u="sng" strike="noStrike" cap="none" normalizeH="0" baseline="0" dirty="0" smtClean="0">
+                          <a:ln>
+                            <a:noFill/>
+                          </a:ln>
+                          <a:solidFill>
+                            <a:schemeClr val="tx1"/>
+                          </a:solidFill>
+                          <a:effectLst/>
+                          <a:latin typeface="Calibri" pitchFamily="34" charset="0"/>
+                          <a:cs typeface="Arial" charset="0"/>
+                        </a:rPr>
+                        <a:t>Actions </a:t>
+                      </a:r>
+                      <a:r>
+                        <a:rPr kumimoji="0" lang="fr-FR" sz="1200" b="1" i="0" u="sng" strike="noStrike" cap="none" normalizeH="0" baseline="0" dirty="0" err="1" smtClean="0">
+                          <a:ln>
+                            <a:noFill/>
+                          </a:ln>
+                          <a:solidFill>
+                            <a:schemeClr val="tx1"/>
+                          </a:solidFill>
+                          <a:effectLst/>
+                          <a:latin typeface="Calibri" pitchFamily="34" charset="0"/>
+                          <a:cs typeface="Arial" charset="0"/>
+                        </a:rPr>
+                        <a:t>Done</a:t>
+                      </a:r>
+                      <a:endParaRPr kumimoji="0" lang="fr-FR" sz="1200" b="1" i="0" u="sng" strike="noStrike" cap="none" normalizeH="0" baseline="0" dirty="0" smtClean="0">
+                        <a:ln>
+                          <a:noFill/>
+                        </a:ln>
+                        <a:solidFill>
+                          <a:schemeClr val="tx1"/>
+                        </a:solidFill>
+                        <a:effectLst/>
+                        <a:latin typeface="Calibri" pitchFamily="34" charset="0"/>
+                        <a:cs typeface="Arial" charset="0"/>
+                      </a:endParaRPr>
+                    </a:p>
+                    <a:p>
+                      <a:pPr marL="0" marR="0" lvl="0" indent="0" algn="l" defTabSz="914400" rtl="0" eaLnBrk="1" fontAlgn="base" latinLnBrk="0" hangingPunct="1">
+                        <a:lnSpc>
+                          <a:spcPct val="100000"/>
+                        </a:lnSpc>
+                        <a:spcBef>
+                          <a:spcPct val="0"/>
+                        </a:spcBef>
+                        <a:spcAft>
+                          <a:spcPct val="0"/>
+                        </a:spcAft>
+                        <a:buClrTx/>
+                        <a:buSzTx/>
+                        <a:buFontTx/>
+                        <a:buNone/>
+                        <a:tabLst/>
+                      </a:pPr>
+                      <a:r>
+                        <a:rPr kumimoji="0" lang="fr-FR" sz="900" b="0" i="0" u="none" strike="noStrike" cap="none" normalizeH="0" baseline="0" dirty="0" smtClean="0">
+                          <a:ln>
+                            <a:noFill/>
+                          </a:ln>
+                          <a:solidFill>
+                            <a:schemeClr val="tx1"/>
+                          </a:solidFill>
+                          <a:effectLst/>
+                          <a:latin typeface="Calibri" pitchFamily="34" charset="0"/>
+                          <a:cs typeface="Arial" charset="0"/>
+                        </a:rPr>
+                        <a:t>0 </a:t>
+                      </a:r>
+                      <a:r>
+                        <a:rPr kumimoji="0" lang="fr-FR" sz="900" b="0" i="0" u="none" strike="noStrike" cap="none" normalizeH="0" baseline="0" dirty="0" smtClean="0">
+                          <a:ln>
+                            <a:noFill/>
+                          </a:ln>
+                          <a:solidFill>
+                            <a:schemeClr val="tx1"/>
+                          </a:solidFill>
+                          <a:effectLst/>
+                          <a:latin typeface="Calibri" pitchFamily="34" charset="0"/>
+                          <a:cs typeface="Arial" charset="0"/>
+                        </a:rPr>
+                        <a:t>-</a:t>
+                      </a:r>
+                      <a:endParaRPr kumimoji="0" lang="fr-FR" sz="900" b="0" i="0" u="none" strike="noStrike" cap="none" normalizeH="0" baseline="0" dirty="0" smtClean="0">
+                        <a:ln>
+                          <a:noFill/>
+                        </a:ln>
+                        <a:solidFill>
+                          <a:schemeClr val="tx1"/>
+                        </a:solidFill>
+                        <a:effectLst/>
+                        <a:latin typeface="Calibri" pitchFamily="34" charset="0"/>
+                        <a:cs typeface="Arial" charset="0"/>
+                      </a:endParaRPr>
+                    </a:p>
+                    <a:p>
+                      <a:pPr marL="0" marR="0" lvl="0" indent="0" algn="l" defTabSz="914400" rtl="0" eaLnBrk="1" fontAlgn="base" latinLnBrk="0" hangingPunct="1">
+                        <a:lnSpc>
+                          <a:spcPct val="100000"/>
+                        </a:lnSpc>
+                        <a:spcBef>
+                          <a:spcPct val="0"/>
+                        </a:spcBef>
+                        <a:spcAft>
+                          <a:spcPct val="0"/>
+                        </a:spcAft>
+                        <a:buClrTx/>
+                        <a:buSzTx/>
+                        <a:buFontTx/>
+                        <a:buNone/>
+                        <a:tabLst/>
+                      </a:pPr>
+                      <a:r>
+                        <a:rPr kumimoji="0" lang="fr-FR" sz="900" b="0" i="0" u="none" strike="noStrike" cap="none" normalizeH="0" baseline="0" dirty="0" smtClean="0">
+                          <a:ln>
+                            <a:noFill/>
+                          </a:ln>
+                          <a:solidFill>
+                            <a:schemeClr val="tx1"/>
+                          </a:solidFill>
+                          <a:effectLst/>
+                          <a:latin typeface="Calibri" pitchFamily="34" charset="0"/>
+                          <a:cs typeface="Arial" charset="0"/>
+                        </a:rPr>
+                        <a:t>1 - </a:t>
+                      </a:r>
+                    </a:p>
+                    <a:p>
+                      <a:pPr marL="0" marR="0" lvl="0" indent="0" algn="l" defTabSz="914400" rtl="0" eaLnBrk="1" fontAlgn="base" latinLnBrk="0" hangingPunct="1">
+                        <a:lnSpc>
+                          <a:spcPct val="100000"/>
+                        </a:lnSpc>
+                        <a:spcBef>
+                          <a:spcPct val="0"/>
+                        </a:spcBef>
+                        <a:spcAft>
+                          <a:spcPct val="0"/>
+                        </a:spcAft>
+                        <a:buClrTx/>
+                        <a:buSzTx/>
+                        <a:buFontTx/>
+                        <a:buNone/>
+                        <a:tabLst/>
+                      </a:pPr>
+                      <a:r>
+                        <a:rPr kumimoji="0" lang="fr-FR" sz="900" b="0" i="0" u="none" strike="noStrike" cap="none" normalizeH="0" baseline="0" dirty="0" smtClean="0">
+                          <a:ln>
+                            <a:noFill/>
+                          </a:ln>
+                          <a:solidFill>
+                            <a:schemeClr val="tx1"/>
+                          </a:solidFill>
+                          <a:effectLst/>
+                          <a:latin typeface="Calibri" pitchFamily="34" charset="0"/>
+                          <a:cs typeface="Arial" charset="0"/>
+                        </a:rPr>
+                        <a:t>2 -</a:t>
+                      </a:r>
+                    </a:p>
+                    <a:p>
+                      <a:pPr marL="0" marR="0" lvl="0" indent="0" algn="l" defTabSz="914400" rtl="0" eaLnBrk="1" fontAlgn="base" latinLnBrk="0" hangingPunct="1">
+                        <a:lnSpc>
+                          <a:spcPct val="100000"/>
+                        </a:lnSpc>
+                        <a:spcBef>
+                          <a:spcPct val="0"/>
+                        </a:spcBef>
+                        <a:spcAft>
+                          <a:spcPct val="0"/>
+                        </a:spcAft>
+                        <a:buClrTx/>
+                        <a:buSzTx/>
+                        <a:buFontTx/>
+                        <a:buNone/>
+                        <a:tabLst/>
+                      </a:pPr>
+                      <a:r>
+                        <a:rPr kumimoji="0" lang="fr-FR" sz="900" b="0" i="0" u="none" strike="noStrike" cap="none" normalizeH="0" baseline="0" dirty="0" smtClean="0">
+                          <a:ln>
+                            <a:noFill/>
+                          </a:ln>
+                          <a:solidFill>
+                            <a:schemeClr val="tx1"/>
+                          </a:solidFill>
+                          <a:effectLst/>
+                          <a:latin typeface="Calibri" pitchFamily="34" charset="0"/>
+                          <a:cs typeface="Arial" charset="0"/>
+                        </a:rPr>
+                        <a:t>3 -</a:t>
+                      </a:r>
+                    </a:p>
+                    <a:p>
+                      <a:pPr marL="0" marR="0" lvl="0" indent="0" algn="l" defTabSz="914400" rtl="0" eaLnBrk="1" fontAlgn="base" latinLnBrk="0" hangingPunct="1">
+                        <a:lnSpc>
+                          <a:spcPct val="100000"/>
+                        </a:lnSpc>
+                        <a:spcBef>
+                          <a:spcPct val="0"/>
+                        </a:spcBef>
+                        <a:spcAft>
+                          <a:spcPct val="0"/>
+                        </a:spcAft>
+                        <a:buClrTx/>
+                        <a:buSzTx/>
+                        <a:buFontTx/>
+                        <a:buNone/>
+                        <a:tabLst/>
+                      </a:pPr>
+                      <a:r>
+                        <a:rPr kumimoji="0" lang="fr-FR" sz="900" b="0" i="0" u="none" strike="noStrike" cap="none" normalizeH="0" baseline="0" dirty="0" smtClean="0">
+                          <a:ln>
+                            <a:noFill/>
+                          </a:ln>
+                          <a:solidFill>
+                            <a:schemeClr val="tx1"/>
+                          </a:solidFill>
+                          <a:effectLst/>
+                          <a:latin typeface="Calibri" pitchFamily="34" charset="0"/>
+                          <a:cs typeface="Arial" charset="0"/>
+                        </a:rPr>
+                        <a:t>4 -</a:t>
+                      </a:r>
+                    </a:p>
+                    <a:p>
+                      <a:pPr marL="0" marR="0" lvl="0" indent="0" algn="l" defTabSz="914400" rtl="0" eaLnBrk="1" fontAlgn="base" latinLnBrk="0" hangingPunct="1">
+                        <a:lnSpc>
+                          <a:spcPct val="100000"/>
+                        </a:lnSpc>
+                        <a:spcBef>
+                          <a:spcPct val="0"/>
+                        </a:spcBef>
+                        <a:spcAft>
+                          <a:spcPct val="0"/>
+                        </a:spcAft>
+                        <a:buClrTx/>
+                        <a:buSzTx/>
+                        <a:buFontTx/>
+                        <a:buNone/>
+                        <a:tabLst/>
+                      </a:pPr>
+                      <a:r>
+                        <a:rPr kumimoji="0" lang="fr-FR" sz="900" b="0" i="0" u="none" strike="noStrike" cap="none" normalizeH="0" baseline="0" dirty="0" smtClean="0">
+                          <a:ln>
+                            <a:noFill/>
+                          </a:ln>
+                          <a:solidFill>
+                            <a:schemeClr val="tx1"/>
+                          </a:solidFill>
+                          <a:effectLst/>
+                          <a:latin typeface="Calibri" pitchFamily="34" charset="0"/>
+                          <a:cs typeface="Arial" charset="0"/>
+                        </a:rPr>
+                        <a:t>5 -</a:t>
+                      </a:r>
+                    </a:p>
+                    <a:p>
+                      <a:pPr marL="0" marR="0" lvl="0" indent="0" algn="l" defTabSz="914400" rtl="0" eaLnBrk="1" fontAlgn="base" latinLnBrk="0" hangingPunct="1">
+                        <a:lnSpc>
+                          <a:spcPct val="100000"/>
+                        </a:lnSpc>
+                        <a:spcBef>
+                          <a:spcPct val="0"/>
+                        </a:spcBef>
+                        <a:spcAft>
+                          <a:spcPct val="0"/>
+                        </a:spcAft>
+                        <a:buClrTx/>
+                        <a:buSzTx/>
+                        <a:buFontTx/>
+                        <a:buNone/>
+                        <a:tabLst/>
+                      </a:pPr>
+                      <a:r>
+                        <a:rPr kumimoji="0" lang="fr-FR" sz="900" b="0" i="0" u="none" strike="noStrike" cap="none" normalizeH="0" baseline="0" dirty="0" smtClean="0">
+                          <a:ln>
+                            <a:noFill/>
+                          </a:ln>
+                          <a:solidFill>
+                            <a:schemeClr val="tx1"/>
+                          </a:solidFill>
+                          <a:effectLst/>
+                          <a:latin typeface="Calibri" pitchFamily="34" charset="0"/>
+                          <a:cs typeface="Arial" charset="0"/>
+                        </a:rPr>
+                        <a:t>6 </a:t>
+                      </a:r>
+                      <a:r>
+                        <a:rPr kumimoji="0" lang="fr-FR" sz="900" b="0" i="0" u="none" strike="noStrike" cap="none" normalizeH="0" baseline="0" dirty="0" smtClean="0">
+                          <a:ln>
+                            <a:noFill/>
+                          </a:ln>
+                          <a:solidFill>
+                            <a:schemeClr val="tx1"/>
+                          </a:solidFill>
+                          <a:effectLst/>
+                          <a:latin typeface="Calibri" pitchFamily="34" charset="0"/>
+                          <a:cs typeface="Arial" charset="0"/>
+                        </a:rPr>
+                        <a:t>-</a:t>
+                      </a:r>
+                      <a:endParaRPr kumimoji="0" lang="fr-FR" sz="900" b="0" i="0" u="none" strike="noStrike" cap="none" normalizeH="0" baseline="0" dirty="0" smtClean="0">
+                        <a:ln>
+                          <a:noFill/>
+                        </a:ln>
+                        <a:solidFill>
+                          <a:schemeClr val="tx1"/>
+                        </a:solidFill>
+                        <a:effectLst/>
+                        <a:latin typeface="Calibri" pitchFamily="34" charset="0"/>
+                        <a:cs typeface="Arial" charset="0"/>
+                      </a:endParaRPr>
+                    </a:p>
+                    <a:p>
+                      <a:pPr marL="0" marR="0" lvl="0" indent="0" algn="l" defTabSz="914400" rtl="0" eaLnBrk="1" fontAlgn="base" latinLnBrk="0" hangingPunct="1">
+                        <a:lnSpc>
+                          <a:spcPct val="100000"/>
+                        </a:lnSpc>
+                        <a:spcBef>
+                          <a:spcPct val="0"/>
+                        </a:spcBef>
+                        <a:spcAft>
+                          <a:spcPct val="0"/>
+                        </a:spcAft>
+                        <a:buClrTx/>
+                        <a:buSzTx/>
+                        <a:buFontTx/>
+                        <a:buNone/>
+                        <a:tabLst/>
+                      </a:pPr>
+                      <a:r>
+                        <a:rPr kumimoji="0" lang="fr-FR" sz="900" b="0" i="0" u="none" strike="noStrike" cap="none" normalizeH="0" baseline="0" dirty="0" smtClean="0">
+                          <a:ln>
+                            <a:noFill/>
+                          </a:ln>
+                          <a:solidFill>
+                            <a:schemeClr val="tx1"/>
+                          </a:solidFill>
+                          <a:effectLst/>
+                          <a:latin typeface="Calibri" pitchFamily="34" charset="0"/>
+                          <a:cs typeface="Arial" charset="0"/>
+                        </a:rPr>
+                        <a:t>7 </a:t>
+                      </a:r>
+                      <a:r>
+                        <a:rPr kumimoji="0" lang="fr-FR" sz="900" b="0" i="0" u="none" strike="noStrike" cap="none" normalizeH="0" baseline="0" dirty="0" smtClean="0">
+                          <a:ln>
+                            <a:noFill/>
+                          </a:ln>
+                          <a:solidFill>
+                            <a:schemeClr val="tx1"/>
+                          </a:solidFill>
+                          <a:effectLst/>
+                          <a:latin typeface="Calibri" pitchFamily="34" charset="0"/>
+                          <a:cs typeface="Arial" charset="0"/>
+                        </a:rPr>
+                        <a:t>- </a:t>
+                      </a:r>
+                      <a:endParaRPr kumimoji="0" lang="fr-FR" sz="900" b="0" i="0" u="none" strike="noStrike" cap="none" normalizeH="0" baseline="0" dirty="0" smtClean="0">
+                        <a:ln>
+                          <a:noFill/>
+                        </a:ln>
+                        <a:solidFill>
+                          <a:schemeClr val="tx1"/>
+                        </a:solidFill>
+                        <a:effectLst/>
+                        <a:latin typeface="Calibri" pitchFamily="34" charset="0"/>
+                        <a:cs typeface="Arial" charset="0"/>
+                      </a:endParaRPr>
+                    </a:p>
+                  </a:txBody>
+                  <a:tcPr horzOverflow="overflow">
+                    <a:lnL w="12700" cap="flat" cmpd="sng" algn="ctr">
+                      <a:solidFill>
+                        <a:schemeClr val="tx1"/>
+                      </a:solidFill>
+                      <a:prstDash val="solid"/>
+                      <a:round/>
+                      <a:headEnd type="none" w="med" len="med"/>
+                      <a:tailEnd type="none" w="med" len="med"/>
+                    </a:lnL>
+                    <a:lnR w="12700" cap="flat" cmpd="sng" algn="ctr">
+                      <a:solidFill>
+                        <a:schemeClr val="tx1"/>
+                      </a:solidFill>
+                      <a:prstDash val="solid"/>
+                      <a:round/>
+                      <a:headEnd type="none" w="med" len="med"/>
+                      <a:tailEnd type="none" w="med" len="med"/>
+                    </a:lnR>
+                    <a:lnT w="12700" cap="flat" cmpd="sng" algn="ctr">
+                      <a:solidFill>
+                        <a:schemeClr val="tx1"/>
+                      </a:solidFill>
+                      <a:prstDash val="solid"/>
+                      <a:round/>
+                      <a:headEnd type="none" w="med" len="med"/>
+                      <a:tailEnd type="none" w="med" len="med"/>
+                    </a:lnT>
+                    <a:lnB w="12700" cap="flat" cmpd="sng" algn="ctr">
+                      <a:solidFill>
+                        <a:schemeClr val="tx1"/>
+                      </a:solidFill>
+                      <a:prstDash val="solid"/>
+                      <a:round/>
+                      <a:headEnd type="none" w="med" len="med"/>
+                      <a:tailEnd type="none" w="med" len="med"/>
+                    </a:lnB>
+                    <a:lnTlToBr>
+                      <a:noFill/>
+                    </a:lnTlToBr>
+                    <a:lnBlToTr>
+                      <a:noFill/>
+                    </a:lnBlToTr>
+                    <a:noFill/>
+                  </a:tcPr>
+                </a:tc>
+                <a:tc>
+                  <a:txBody>
+                    <a:bodyPr/>
+                    <a:lstStyle/>
+                    <a:p>
+                      <a:pPr marL="0" marR="0" lvl="0" indent="0" algn="ctr" defTabSz="914400" rtl="0" eaLnBrk="1" fontAlgn="base" latinLnBrk="0" hangingPunct="1">
+                        <a:lnSpc>
+                          <a:spcPct val="100000"/>
+                        </a:lnSpc>
+                        <a:spcBef>
+                          <a:spcPct val="0"/>
+                        </a:spcBef>
+                        <a:spcAft>
+                          <a:spcPct val="0"/>
+                        </a:spcAft>
+                        <a:buClrTx/>
+                        <a:buSzTx/>
+                        <a:buFontTx/>
+                        <a:buNone/>
+                        <a:tabLst/>
+                      </a:pPr>
+                      <a:r>
+                        <a:rPr kumimoji="0" lang="fr-FR" sz="1200" b="1" i="0" u="sng" strike="noStrike" cap="none" normalizeH="0" baseline="0" dirty="0" err="1" smtClean="0">
+                          <a:ln>
+                            <a:noFill/>
+                          </a:ln>
+                          <a:solidFill>
+                            <a:schemeClr val="tx1"/>
+                          </a:solidFill>
+                          <a:effectLst/>
+                          <a:latin typeface="Calibri" pitchFamily="34" charset="0"/>
+                          <a:cs typeface="Arial" charset="0"/>
+                        </a:rPr>
+                        <a:t>Forbbiden</a:t>
+                      </a:r>
+                      <a:r>
+                        <a:rPr kumimoji="0" lang="fr-FR" sz="1200" b="1" i="0" u="sng" strike="noStrike" cap="none" normalizeH="0" baseline="0" dirty="0" smtClean="0">
+                          <a:ln>
+                            <a:noFill/>
+                          </a:ln>
+                          <a:solidFill>
+                            <a:schemeClr val="tx1"/>
+                          </a:solidFill>
+                          <a:effectLst/>
+                          <a:latin typeface="Calibri" pitchFamily="34" charset="0"/>
+                          <a:cs typeface="Arial" charset="0"/>
+                        </a:rPr>
+                        <a:t> Zones</a:t>
+                      </a:r>
+                      <a:endParaRPr kumimoji="0" lang="fr-FR" sz="1200" b="1" i="0" u="sng" strike="noStrike" cap="none" normalizeH="0" baseline="0" dirty="0" smtClean="0">
+                        <a:ln>
+                          <a:noFill/>
+                        </a:ln>
+                        <a:solidFill>
+                          <a:schemeClr val="tx1"/>
+                        </a:solidFill>
+                        <a:effectLst/>
+                        <a:latin typeface="Calibri" pitchFamily="34" charset="0"/>
+                        <a:cs typeface="Arial" charset="0"/>
+                      </a:endParaRPr>
+                    </a:p>
+                    <a:p>
+                      <a:pPr marL="0" marR="0" lvl="0" indent="0" algn="l" defTabSz="914400" rtl="0" eaLnBrk="1" fontAlgn="base" latinLnBrk="0" hangingPunct="1">
+                        <a:lnSpc>
+                          <a:spcPct val="100000"/>
+                        </a:lnSpc>
+                        <a:spcBef>
+                          <a:spcPct val="0"/>
+                        </a:spcBef>
+                        <a:spcAft>
+                          <a:spcPct val="0"/>
+                        </a:spcAft>
+                        <a:buClrTx/>
+                        <a:buSzTx/>
+                        <a:buFontTx/>
+                        <a:buNone/>
+                        <a:tabLst/>
+                      </a:pPr>
+                      <a:r>
+                        <a:rPr kumimoji="0" lang="fr-FR" sz="900" b="0" i="0" u="none" strike="noStrike" cap="none" normalizeH="0" baseline="0" dirty="0" smtClean="0">
+                          <a:ln>
+                            <a:noFill/>
+                          </a:ln>
+                          <a:solidFill>
+                            <a:srgbClr val="000000"/>
+                          </a:solidFill>
+                          <a:effectLst/>
+                          <a:latin typeface="Calibri" pitchFamily="34" charset="0"/>
+                          <a:cs typeface="Arial" charset="0"/>
+                        </a:rPr>
+                        <a:t>8 </a:t>
+                      </a:r>
+                      <a:r>
+                        <a:rPr kumimoji="0" lang="fr-FR" sz="900" b="0" i="0" u="none" strike="noStrike" cap="none" normalizeH="0" baseline="0" dirty="0" smtClean="0">
+                          <a:ln>
+                            <a:noFill/>
+                          </a:ln>
+                          <a:solidFill>
+                            <a:srgbClr val="000000"/>
+                          </a:solidFill>
+                          <a:effectLst/>
+                          <a:latin typeface="Calibri" pitchFamily="34" charset="0"/>
+                          <a:cs typeface="Arial" charset="0"/>
+                        </a:rPr>
+                        <a:t>-</a:t>
+                      </a:r>
+                      <a:endParaRPr kumimoji="0" lang="fr-FR" sz="900" b="0" i="0" u="none" strike="noStrike" cap="none" normalizeH="0" baseline="0" dirty="0" smtClean="0">
+                        <a:ln>
+                          <a:noFill/>
+                        </a:ln>
+                        <a:solidFill>
+                          <a:srgbClr val="000000"/>
+                        </a:solidFill>
+                        <a:effectLst/>
+                        <a:latin typeface="Calibri" pitchFamily="34" charset="0"/>
+                        <a:cs typeface="Arial" charset="0"/>
+                      </a:endParaRPr>
+                    </a:p>
+                    <a:p>
+                      <a:pPr marL="0" marR="0" lvl="0" indent="0" algn="l" defTabSz="914400" rtl="0" eaLnBrk="1" fontAlgn="base" latinLnBrk="0" hangingPunct="1">
+                        <a:lnSpc>
+                          <a:spcPct val="100000"/>
+                        </a:lnSpc>
+                        <a:spcBef>
+                          <a:spcPct val="0"/>
+                        </a:spcBef>
+                        <a:spcAft>
+                          <a:spcPct val="0"/>
+                        </a:spcAft>
+                        <a:buClrTx/>
+                        <a:buSzTx/>
+                        <a:buFontTx/>
+                        <a:buNone/>
+                        <a:tabLst/>
+                      </a:pPr>
+                      <a:r>
+                        <a:rPr kumimoji="0" lang="fr-FR" sz="900" b="0" i="0" u="none" strike="noStrike" cap="none" normalizeH="0" baseline="0" dirty="0" smtClean="0">
+                          <a:ln>
+                            <a:noFill/>
+                          </a:ln>
+                          <a:solidFill>
+                            <a:srgbClr val="000000"/>
+                          </a:solidFill>
+                          <a:effectLst/>
+                          <a:latin typeface="Calibri" pitchFamily="34" charset="0"/>
+                          <a:cs typeface="Arial" charset="0"/>
+                        </a:rPr>
+                        <a:t>9 </a:t>
+                      </a:r>
+                      <a:r>
+                        <a:rPr kumimoji="0" lang="fr-FR" sz="900" b="0" i="0" u="none" strike="noStrike" cap="none" normalizeH="0" baseline="0" dirty="0" smtClean="0">
+                          <a:ln>
+                            <a:noFill/>
+                          </a:ln>
+                          <a:solidFill>
+                            <a:srgbClr val="000000"/>
+                          </a:solidFill>
+                          <a:effectLst/>
+                          <a:latin typeface="Calibri" pitchFamily="34" charset="0"/>
+                          <a:cs typeface="Arial" charset="0"/>
+                        </a:rPr>
+                        <a:t>-</a:t>
+                      </a:r>
+                      <a:endParaRPr kumimoji="0" lang="fr-FR" sz="900" b="0" i="0" u="none" strike="noStrike" cap="none" normalizeH="0" baseline="0" dirty="0" smtClean="0">
+                        <a:ln>
+                          <a:noFill/>
+                        </a:ln>
+                        <a:solidFill>
+                          <a:srgbClr val="000000"/>
+                        </a:solidFill>
+                        <a:effectLst/>
+                        <a:latin typeface="Calibri" pitchFamily="34" charset="0"/>
+                        <a:cs typeface="Arial" charset="0"/>
+                      </a:endParaRPr>
+                    </a:p>
+                    <a:p>
+                      <a:pPr marL="0" marR="0" lvl="0" indent="0" algn="l" defTabSz="914400" rtl="0" eaLnBrk="1" fontAlgn="base" latinLnBrk="0" hangingPunct="1">
+                        <a:lnSpc>
+                          <a:spcPct val="100000"/>
+                        </a:lnSpc>
+                        <a:spcBef>
+                          <a:spcPct val="0"/>
+                        </a:spcBef>
+                        <a:spcAft>
+                          <a:spcPct val="0"/>
+                        </a:spcAft>
+                        <a:buClrTx/>
+                        <a:buSzTx/>
+                        <a:buFontTx/>
+                        <a:buNone/>
+                        <a:tabLst/>
+                      </a:pPr>
+                      <a:r>
+                        <a:rPr kumimoji="0" lang="fr-FR" sz="900" b="0" i="0" u="none" strike="noStrike" cap="none" normalizeH="0" baseline="0" dirty="0" smtClean="0">
+                          <a:ln>
+                            <a:noFill/>
+                          </a:ln>
+                          <a:solidFill>
+                            <a:srgbClr val="000000"/>
+                          </a:solidFill>
+                          <a:effectLst/>
+                          <a:latin typeface="Calibri" pitchFamily="34" charset="0"/>
+                          <a:cs typeface="Arial" charset="0"/>
+                        </a:rPr>
+                        <a:t>10 - </a:t>
+                      </a:r>
+                      <a:endParaRPr kumimoji="0" lang="fr-FR" sz="900" b="0" i="0" u="none" strike="noStrike" cap="none" normalizeH="0" baseline="0" dirty="0" smtClean="0">
+                        <a:ln>
+                          <a:noFill/>
+                        </a:ln>
+                        <a:solidFill>
+                          <a:srgbClr val="000000"/>
+                        </a:solidFill>
+                        <a:effectLst/>
+                        <a:latin typeface="Calibri" pitchFamily="34" charset="0"/>
+                        <a:cs typeface="Arial" charset="0"/>
+                      </a:endParaRPr>
+                    </a:p>
+                    <a:p>
+                      <a:pPr marL="0" marR="0" lvl="0" indent="0" algn="l" defTabSz="914400" rtl="0" eaLnBrk="1" fontAlgn="base" latinLnBrk="0" hangingPunct="1">
+                        <a:lnSpc>
+                          <a:spcPct val="100000"/>
+                        </a:lnSpc>
+                        <a:spcBef>
+                          <a:spcPct val="0"/>
+                        </a:spcBef>
+                        <a:spcAft>
+                          <a:spcPct val="0"/>
+                        </a:spcAft>
+                        <a:buClrTx/>
+                        <a:buSzTx/>
+                        <a:buFontTx/>
+                        <a:buNone/>
+                        <a:tabLst/>
+                      </a:pPr>
+                      <a:r>
+                        <a:rPr kumimoji="0" lang="fr-FR" sz="900" b="0" i="0" u="none" strike="noStrike" cap="none" normalizeH="0" baseline="0" dirty="0" smtClean="0">
+                          <a:ln>
+                            <a:noFill/>
+                          </a:ln>
+                          <a:solidFill>
+                            <a:srgbClr val="000000"/>
+                          </a:solidFill>
+                          <a:effectLst/>
+                          <a:latin typeface="Calibri" pitchFamily="34" charset="0"/>
+                          <a:cs typeface="Arial" charset="0"/>
+                        </a:rPr>
+                        <a:t>11 -</a:t>
+                      </a:r>
+                    </a:p>
+                    <a:p>
+                      <a:pPr marL="0" marR="0" lvl="0" indent="0" algn="l" defTabSz="914400" rtl="0" eaLnBrk="1" fontAlgn="base" latinLnBrk="0" hangingPunct="1">
+                        <a:lnSpc>
+                          <a:spcPct val="100000"/>
+                        </a:lnSpc>
+                        <a:spcBef>
+                          <a:spcPct val="0"/>
+                        </a:spcBef>
+                        <a:spcAft>
+                          <a:spcPct val="0"/>
+                        </a:spcAft>
+                        <a:buClrTx/>
+                        <a:buSzTx/>
+                        <a:buFontTx/>
+                        <a:buNone/>
+                        <a:tabLst/>
+                      </a:pPr>
+                      <a:r>
+                        <a:rPr kumimoji="0" lang="fr-FR" sz="900" b="0" i="0" u="none" strike="noStrike" cap="none" normalizeH="0" baseline="0" dirty="0" smtClean="0">
+                          <a:ln>
+                            <a:noFill/>
+                          </a:ln>
+                          <a:solidFill>
+                            <a:srgbClr val="000000"/>
+                          </a:solidFill>
+                          <a:effectLst/>
+                          <a:latin typeface="Calibri" pitchFamily="34" charset="0"/>
+                          <a:cs typeface="Arial" charset="0"/>
+                        </a:rPr>
+                        <a:t>12 -</a:t>
+                      </a:r>
+                    </a:p>
+                    <a:p>
+                      <a:pPr marL="0" marR="0" lvl="0" indent="0" algn="l" defTabSz="914400" rtl="0" eaLnBrk="1" fontAlgn="base" latinLnBrk="0" hangingPunct="1">
+                        <a:lnSpc>
+                          <a:spcPct val="100000"/>
+                        </a:lnSpc>
+                        <a:spcBef>
+                          <a:spcPct val="0"/>
+                        </a:spcBef>
+                        <a:spcAft>
+                          <a:spcPct val="0"/>
+                        </a:spcAft>
+                        <a:buClrTx/>
+                        <a:buSzTx/>
+                        <a:buFontTx/>
+                        <a:buNone/>
+                        <a:tabLst/>
+                      </a:pPr>
+                      <a:r>
+                        <a:rPr kumimoji="0" lang="fr-FR" sz="900" b="0" i="0" u="none" strike="noStrike" cap="none" normalizeH="0" baseline="0" dirty="0" smtClean="0">
+                          <a:ln>
+                            <a:noFill/>
+                          </a:ln>
+                          <a:solidFill>
+                            <a:srgbClr val="000000"/>
+                          </a:solidFill>
+                          <a:effectLst/>
+                          <a:latin typeface="Calibri" pitchFamily="34" charset="0"/>
+                          <a:cs typeface="Arial" charset="0"/>
+                        </a:rPr>
+                        <a:t>13 -</a:t>
+                      </a:r>
+                    </a:p>
+                    <a:p>
+                      <a:pPr marL="0" marR="0" lvl="0" indent="0" algn="l" defTabSz="914400" rtl="0" eaLnBrk="1" fontAlgn="base" latinLnBrk="0" hangingPunct="1">
+                        <a:lnSpc>
+                          <a:spcPct val="100000"/>
+                        </a:lnSpc>
+                        <a:spcBef>
+                          <a:spcPct val="0"/>
+                        </a:spcBef>
+                        <a:spcAft>
+                          <a:spcPct val="0"/>
+                        </a:spcAft>
+                        <a:buClrTx/>
+                        <a:buSzTx/>
+                        <a:buFontTx/>
+                        <a:buNone/>
+                        <a:tabLst/>
+                      </a:pPr>
+                      <a:r>
+                        <a:rPr kumimoji="0" lang="fr-FR" sz="900" b="0" i="0" u="none" strike="noStrike" cap="none" normalizeH="0" baseline="0" dirty="0" smtClean="0">
+                          <a:ln>
+                            <a:noFill/>
+                          </a:ln>
+                          <a:solidFill>
+                            <a:srgbClr val="000000"/>
+                          </a:solidFill>
+                          <a:effectLst/>
+                          <a:latin typeface="Calibri" pitchFamily="34" charset="0"/>
+                          <a:cs typeface="Arial" charset="0"/>
+                        </a:rPr>
+                        <a:t>14 -</a:t>
+                      </a:r>
+                    </a:p>
+                    <a:p>
+                      <a:pPr marL="0" marR="0" lvl="0" indent="0" algn="l" defTabSz="914400" rtl="0" eaLnBrk="1" fontAlgn="base" latinLnBrk="0" hangingPunct="1">
+                        <a:lnSpc>
+                          <a:spcPct val="100000"/>
+                        </a:lnSpc>
+                        <a:spcBef>
+                          <a:spcPct val="0"/>
+                        </a:spcBef>
+                        <a:spcAft>
+                          <a:spcPct val="0"/>
+                        </a:spcAft>
+                        <a:buClrTx/>
+                        <a:buSzTx/>
+                        <a:buFontTx/>
+                        <a:buNone/>
+                        <a:tabLst/>
+                      </a:pPr>
+                      <a:r>
+                        <a:rPr kumimoji="0" lang="fr-FR" sz="900" b="0" i="0" u="none" strike="noStrike" cap="none" normalizeH="0" baseline="0" dirty="0" smtClean="0">
+                          <a:ln>
+                            <a:noFill/>
+                          </a:ln>
+                          <a:solidFill>
+                            <a:srgbClr val="000000"/>
+                          </a:solidFill>
+                          <a:effectLst/>
+                          <a:latin typeface="Calibri" pitchFamily="34" charset="0"/>
+                          <a:cs typeface="Arial" charset="0"/>
+                        </a:rPr>
+                        <a:t>15 -</a:t>
+                      </a:r>
+                      <a:endParaRPr kumimoji="0" lang="fr-FR" sz="1200" b="1" i="0" u="sng" strike="noStrike" cap="none" normalizeH="0" baseline="0" dirty="0" smtClean="0">
+                        <a:ln>
+                          <a:noFill/>
+                        </a:ln>
+                        <a:solidFill>
+                          <a:schemeClr val="tx1"/>
+                        </a:solidFill>
+                        <a:effectLst/>
+                        <a:latin typeface="Calibri" pitchFamily="34" charset="0"/>
+                        <a:cs typeface="Arial" charset="0"/>
+                      </a:endParaRPr>
+                    </a:p>
+                  </a:txBody>
+                  <a:tcPr horzOverflow="overflow">
+                    <a:lnL w="12700" cap="flat" cmpd="sng" algn="ctr">
+                      <a:solidFill>
+                        <a:schemeClr val="tx1"/>
+                      </a:solidFill>
+                      <a:prstDash val="solid"/>
+                      <a:round/>
+                      <a:headEnd type="none" w="med" len="med"/>
+                      <a:tailEnd type="none" w="med" len="med"/>
+                    </a:lnL>
+                    <a:lnR w="12700" cap="flat" cmpd="sng" algn="ctr">
+                      <a:solidFill>
+                        <a:schemeClr val="tx1"/>
+                      </a:solidFill>
+                      <a:prstDash val="solid"/>
+                      <a:round/>
+                      <a:headEnd type="none" w="med" len="med"/>
+                      <a:tailEnd type="none" w="med" len="med"/>
+                    </a:lnR>
+                    <a:lnT w="12700" cap="flat" cmpd="sng" algn="ctr">
+                      <a:solidFill>
+                        <a:schemeClr val="tx1"/>
+                      </a:solidFill>
+                      <a:prstDash val="solid"/>
+                      <a:round/>
+                      <a:headEnd type="none" w="med" len="med"/>
+                      <a:tailEnd type="none" w="med" len="med"/>
+                    </a:lnT>
+                    <a:lnB w="12700" cap="flat" cmpd="sng" algn="ctr">
+                      <a:solidFill>
+                        <a:schemeClr val="tx1"/>
+                      </a:solidFill>
+                      <a:prstDash val="solid"/>
+                      <a:round/>
+                      <a:headEnd type="none" w="med" len="med"/>
+                      <a:tailEnd type="none" w="med" len="med"/>
+                    </a:lnB>
+                    <a:lnTlToBr>
+                      <a:noFill/>
+                    </a:lnTlToBr>
+                    <a:lnBlToTr>
+                      <a:noFill/>
+                    </a:lnBlToTr>
+                    <a:noFill/>
+                  </a:tcPr>
+                </a:tc>
+                <a:tc>
+                  <a:txBody>
+                    <a:bodyPr/>
+                    <a:lstStyle/>
+                    <a:p>
+                      <a:pPr marL="0" marR="0" lvl="0" indent="0" algn="ctr" defTabSz="914400" rtl="0" eaLnBrk="1" fontAlgn="base" latinLnBrk="0" hangingPunct="1">
+                        <a:lnSpc>
+                          <a:spcPct val="100000"/>
+                        </a:lnSpc>
+                        <a:spcBef>
+                          <a:spcPct val="0"/>
+                        </a:spcBef>
+                        <a:spcAft>
+                          <a:spcPct val="0"/>
+                        </a:spcAft>
+                        <a:buClrTx/>
+                        <a:buSzTx/>
+                        <a:buFontTx/>
+                        <a:buNone/>
+                        <a:tabLst/>
+                      </a:pPr>
+                      <a:r>
+                        <a:rPr kumimoji="0" lang="fr-FR" sz="1200" b="1" i="0" u="sng" strike="noStrike" cap="none" normalizeH="0" baseline="0" dirty="0" smtClean="0">
+                          <a:ln>
+                            <a:noFill/>
+                          </a:ln>
+                          <a:solidFill>
+                            <a:schemeClr val="tx1"/>
+                          </a:solidFill>
+                          <a:effectLst/>
+                          <a:latin typeface="Calibri" pitchFamily="34" charset="0"/>
+                          <a:cs typeface="Arial" charset="0"/>
+                        </a:rPr>
+                        <a:t>Not </a:t>
+                      </a:r>
+                      <a:r>
+                        <a:rPr kumimoji="0" lang="fr-FR" sz="1200" b="1" i="0" u="sng" strike="noStrike" cap="none" normalizeH="0" baseline="0" dirty="0" err="1" smtClean="0">
+                          <a:ln>
+                            <a:noFill/>
+                          </a:ln>
+                          <a:solidFill>
+                            <a:schemeClr val="tx1"/>
+                          </a:solidFill>
+                          <a:effectLst/>
+                          <a:latin typeface="Calibri" pitchFamily="34" charset="0"/>
+                          <a:cs typeface="Arial" charset="0"/>
+                        </a:rPr>
+                        <a:t>Used</a:t>
+                      </a:r>
+                      <a:endParaRPr kumimoji="0" lang="fr-FR" sz="1200" b="1" i="0" u="sng" strike="noStrike" cap="none" normalizeH="0" baseline="0" dirty="0" smtClean="0">
+                        <a:ln>
+                          <a:noFill/>
+                        </a:ln>
+                        <a:solidFill>
+                          <a:schemeClr val="tx1"/>
+                        </a:solidFill>
+                        <a:effectLst/>
+                        <a:latin typeface="Calibri" pitchFamily="34" charset="0"/>
+                        <a:cs typeface="Arial" charset="0"/>
+                      </a:endParaRPr>
+                    </a:p>
+                    <a:p>
+                      <a:pPr marL="0" marR="0" lvl="0" indent="0" algn="l" defTabSz="914400" rtl="0" eaLnBrk="1" fontAlgn="base" latinLnBrk="0" hangingPunct="1">
+                        <a:lnSpc>
+                          <a:spcPct val="100000"/>
+                        </a:lnSpc>
+                        <a:spcBef>
+                          <a:spcPct val="0"/>
+                        </a:spcBef>
+                        <a:spcAft>
+                          <a:spcPct val="0"/>
+                        </a:spcAft>
+                        <a:buClrTx/>
+                        <a:buSzTx/>
+                        <a:buFontTx/>
+                        <a:buNone/>
+                        <a:tabLst/>
+                      </a:pPr>
+                      <a:r>
+                        <a:rPr kumimoji="0" lang="fr-FR" sz="900" b="0" i="0" u="none" strike="noStrike" cap="none" normalizeH="0" baseline="0" dirty="0" smtClean="0">
+                          <a:ln>
+                            <a:noFill/>
+                          </a:ln>
+                          <a:solidFill>
+                            <a:srgbClr val="000000"/>
+                          </a:solidFill>
+                          <a:effectLst/>
+                          <a:latin typeface="Calibri" pitchFamily="34" charset="0"/>
+                          <a:cs typeface="Arial" charset="0"/>
+                        </a:rPr>
+                        <a:t>16 -</a:t>
+                      </a:r>
+                    </a:p>
+                    <a:p>
+                      <a:pPr marL="0" marR="0" lvl="0" indent="0" algn="l" defTabSz="914400" rtl="0" eaLnBrk="1" fontAlgn="base" latinLnBrk="0" hangingPunct="1">
+                        <a:lnSpc>
+                          <a:spcPct val="100000"/>
+                        </a:lnSpc>
+                        <a:spcBef>
+                          <a:spcPct val="0"/>
+                        </a:spcBef>
+                        <a:spcAft>
+                          <a:spcPct val="0"/>
+                        </a:spcAft>
+                        <a:buClrTx/>
+                        <a:buSzTx/>
+                        <a:buFontTx/>
+                        <a:buNone/>
+                        <a:tabLst/>
+                      </a:pPr>
+                      <a:r>
+                        <a:rPr kumimoji="0" lang="fr-FR" sz="900" b="0" i="0" u="none" strike="noStrike" cap="none" normalizeH="0" baseline="0" dirty="0" smtClean="0">
+                          <a:ln>
+                            <a:noFill/>
+                          </a:ln>
+                          <a:solidFill>
+                            <a:srgbClr val="000000"/>
+                          </a:solidFill>
+                          <a:effectLst/>
+                          <a:latin typeface="Calibri" pitchFamily="34" charset="0"/>
+                          <a:cs typeface="Arial" charset="0"/>
+                        </a:rPr>
+                        <a:t>17 -</a:t>
+                      </a:r>
+                    </a:p>
+                    <a:p>
+                      <a:pPr marL="0" marR="0" lvl="0" indent="0" algn="l" defTabSz="914400" rtl="0" eaLnBrk="1" fontAlgn="base" latinLnBrk="0" hangingPunct="1">
+                        <a:lnSpc>
+                          <a:spcPct val="100000"/>
+                        </a:lnSpc>
+                        <a:spcBef>
+                          <a:spcPct val="0"/>
+                        </a:spcBef>
+                        <a:spcAft>
+                          <a:spcPct val="0"/>
+                        </a:spcAft>
+                        <a:buClrTx/>
+                        <a:buSzTx/>
+                        <a:buFontTx/>
+                        <a:buNone/>
+                        <a:tabLst/>
+                      </a:pPr>
+                      <a:r>
+                        <a:rPr kumimoji="0" lang="fr-FR" sz="900" b="0" i="0" u="none" strike="noStrike" cap="none" normalizeH="0" baseline="0" dirty="0" smtClean="0">
+                          <a:ln>
+                            <a:noFill/>
+                          </a:ln>
+                          <a:solidFill>
+                            <a:srgbClr val="000000"/>
+                          </a:solidFill>
+                          <a:effectLst/>
+                          <a:latin typeface="Calibri" pitchFamily="34" charset="0"/>
+                          <a:cs typeface="Arial" charset="0"/>
+                        </a:rPr>
+                        <a:t>18 -</a:t>
+                      </a:r>
+                    </a:p>
+                    <a:p>
+                      <a:pPr marL="0" marR="0" lvl="0" indent="0" algn="l" defTabSz="914400" rtl="0" eaLnBrk="1" fontAlgn="base" latinLnBrk="0" hangingPunct="1">
+                        <a:lnSpc>
+                          <a:spcPct val="100000"/>
+                        </a:lnSpc>
+                        <a:spcBef>
+                          <a:spcPct val="0"/>
+                        </a:spcBef>
+                        <a:spcAft>
+                          <a:spcPct val="0"/>
+                        </a:spcAft>
+                        <a:buClrTx/>
+                        <a:buSzTx/>
+                        <a:buFontTx/>
+                        <a:buNone/>
+                        <a:tabLst/>
+                      </a:pPr>
+                      <a:r>
+                        <a:rPr kumimoji="0" lang="fr-FR" sz="900" b="0" i="0" u="none" strike="noStrike" cap="none" normalizeH="0" baseline="0" dirty="0" smtClean="0">
+                          <a:ln>
+                            <a:noFill/>
+                          </a:ln>
+                          <a:solidFill>
+                            <a:srgbClr val="000000"/>
+                          </a:solidFill>
+                          <a:effectLst/>
+                          <a:latin typeface="Calibri" pitchFamily="34" charset="0"/>
+                          <a:cs typeface="Arial" charset="0"/>
+                        </a:rPr>
+                        <a:t>19 -</a:t>
+                      </a:r>
+                    </a:p>
+                    <a:p>
+                      <a:pPr marL="0" marR="0" lvl="0" indent="0" algn="l" defTabSz="914400" rtl="0" eaLnBrk="1" fontAlgn="base" latinLnBrk="0" hangingPunct="1">
+                        <a:lnSpc>
+                          <a:spcPct val="100000"/>
+                        </a:lnSpc>
+                        <a:spcBef>
+                          <a:spcPct val="0"/>
+                        </a:spcBef>
+                        <a:spcAft>
+                          <a:spcPct val="0"/>
+                        </a:spcAft>
+                        <a:buClrTx/>
+                        <a:buSzTx/>
+                        <a:buFontTx/>
+                        <a:buNone/>
+                        <a:tabLst/>
+                      </a:pPr>
+                      <a:r>
+                        <a:rPr kumimoji="0" lang="fr-FR" sz="900" b="0" i="0" u="none" strike="noStrike" cap="none" normalizeH="0" baseline="0" dirty="0" smtClean="0">
+                          <a:ln>
+                            <a:noFill/>
+                          </a:ln>
+                          <a:solidFill>
+                            <a:srgbClr val="000000"/>
+                          </a:solidFill>
+                          <a:effectLst/>
+                          <a:latin typeface="Calibri" pitchFamily="34" charset="0"/>
+                          <a:cs typeface="Arial" charset="0"/>
+                        </a:rPr>
+                        <a:t>20 -</a:t>
+                      </a:r>
+                    </a:p>
+                    <a:p>
+                      <a:pPr marL="0" marR="0" lvl="0" indent="0" algn="l" defTabSz="914400" rtl="0" eaLnBrk="1" fontAlgn="base" latinLnBrk="0" hangingPunct="1">
+                        <a:lnSpc>
+                          <a:spcPct val="100000"/>
+                        </a:lnSpc>
+                        <a:spcBef>
+                          <a:spcPct val="0"/>
+                        </a:spcBef>
+                        <a:spcAft>
+                          <a:spcPct val="0"/>
+                        </a:spcAft>
+                        <a:buClrTx/>
+                        <a:buSzTx/>
+                        <a:buFontTx/>
+                        <a:buNone/>
+                        <a:tabLst/>
+                      </a:pPr>
+                      <a:r>
+                        <a:rPr kumimoji="0" lang="fr-FR" sz="900" b="0" i="0" u="none" strike="noStrike" cap="none" normalizeH="0" baseline="0" dirty="0" smtClean="0">
+                          <a:ln>
+                            <a:noFill/>
+                          </a:ln>
+                          <a:solidFill>
+                            <a:srgbClr val="000000"/>
+                          </a:solidFill>
+                          <a:effectLst/>
+                          <a:latin typeface="Calibri" pitchFamily="34" charset="0"/>
+                          <a:cs typeface="Arial" charset="0"/>
+                        </a:rPr>
+                        <a:t>21 -</a:t>
+                      </a:r>
+                    </a:p>
+                    <a:p>
+                      <a:pPr marL="0" marR="0" lvl="0" indent="0" algn="l" defTabSz="914400" rtl="0" eaLnBrk="1" fontAlgn="base" latinLnBrk="0" hangingPunct="1">
+                        <a:lnSpc>
+                          <a:spcPct val="100000"/>
+                        </a:lnSpc>
+                        <a:spcBef>
+                          <a:spcPct val="0"/>
+                        </a:spcBef>
+                        <a:spcAft>
+                          <a:spcPct val="0"/>
+                        </a:spcAft>
+                        <a:buClrTx/>
+                        <a:buSzTx/>
+                        <a:buFontTx/>
+                        <a:buNone/>
+                        <a:tabLst/>
+                      </a:pPr>
+                      <a:r>
+                        <a:rPr kumimoji="0" lang="fr-FR" sz="900" b="0" i="0" u="none" strike="noStrike" cap="none" normalizeH="0" baseline="0" dirty="0" smtClean="0">
+                          <a:ln>
+                            <a:noFill/>
+                          </a:ln>
+                          <a:solidFill>
+                            <a:srgbClr val="000000"/>
+                          </a:solidFill>
+                          <a:effectLst/>
+                          <a:latin typeface="Calibri" pitchFamily="34" charset="0"/>
+                          <a:cs typeface="Arial" charset="0"/>
+                        </a:rPr>
+                        <a:t>22 -</a:t>
+                      </a:r>
+                    </a:p>
+                    <a:p>
+                      <a:pPr marL="0" marR="0" lvl="0" indent="0" algn="l" defTabSz="914400" rtl="0" eaLnBrk="1" fontAlgn="base" latinLnBrk="0" hangingPunct="1">
+                        <a:lnSpc>
+                          <a:spcPct val="100000"/>
+                        </a:lnSpc>
+                        <a:spcBef>
+                          <a:spcPct val="0"/>
+                        </a:spcBef>
+                        <a:spcAft>
+                          <a:spcPct val="0"/>
+                        </a:spcAft>
+                        <a:buClrTx/>
+                        <a:buSzTx/>
+                        <a:buFontTx/>
+                        <a:buNone/>
+                        <a:tabLst/>
+                      </a:pPr>
+                      <a:r>
+                        <a:rPr kumimoji="0" lang="fr-FR" sz="900" b="0" i="0" u="none" strike="noStrike" cap="none" normalizeH="0" baseline="0" dirty="0" smtClean="0">
+                          <a:ln>
+                            <a:noFill/>
+                          </a:ln>
+                          <a:solidFill>
+                            <a:srgbClr val="000000"/>
+                          </a:solidFill>
+                          <a:effectLst/>
+                          <a:latin typeface="Calibri" pitchFamily="34" charset="0"/>
+                          <a:cs typeface="Arial" charset="0"/>
+                        </a:rPr>
+                        <a:t>23 -</a:t>
+                      </a:r>
+                      <a:endParaRPr kumimoji="0" lang="fr-FR" sz="900" b="1" i="0" u="sng" strike="noStrike" cap="none" normalizeH="0" baseline="0" dirty="0" smtClean="0">
+                        <a:ln>
+                          <a:noFill/>
+                        </a:ln>
+                        <a:solidFill>
+                          <a:schemeClr val="tx1"/>
+                        </a:solidFill>
+                        <a:effectLst/>
+                        <a:latin typeface="Calibri" pitchFamily="34" charset="0"/>
+                        <a:cs typeface="Arial" charset="0"/>
+                      </a:endParaRPr>
+                    </a:p>
+                  </a:txBody>
+                  <a:tcPr horzOverflow="overflow">
+                    <a:lnL w="12700" cap="flat" cmpd="sng" algn="ctr">
+                      <a:solidFill>
+                        <a:schemeClr val="tx1"/>
+                      </a:solidFill>
+                      <a:prstDash val="solid"/>
+                      <a:round/>
+                      <a:headEnd type="none" w="med" len="med"/>
+                      <a:tailEnd type="none" w="med" len="med"/>
+                    </a:lnL>
+                    <a:lnR w="12700" cap="flat" cmpd="sng" algn="ctr">
+                      <a:solidFill>
+                        <a:schemeClr val="tx1"/>
+                      </a:solidFill>
+                      <a:prstDash val="solid"/>
+                      <a:round/>
+                      <a:headEnd type="none" w="med" len="med"/>
+                      <a:tailEnd type="none" w="med" len="med"/>
+                    </a:lnR>
+                    <a:lnT w="12700" cap="flat" cmpd="sng" algn="ctr">
+                      <a:solidFill>
+                        <a:schemeClr val="tx1"/>
+                      </a:solidFill>
+                      <a:prstDash val="solid"/>
+                      <a:round/>
+                      <a:headEnd type="none" w="med" len="med"/>
+                      <a:tailEnd type="none" w="med" len="med"/>
+                    </a:lnT>
+                    <a:lnB w="12700" cap="flat" cmpd="sng" algn="ctr">
+                      <a:solidFill>
+                        <a:schemeClr val="tx1"/>
+                      </a:solidFill>
+                      <a:prstDash val="solid"/>
+                      <a:round/>
+                      <a:headEnd type="none" w="med" len="med"/>
+                      <a:tailEnd type="none" w="med" len="med"/>
+                    </a:lnB>
+                    <a:lnTlToBr>
+                      <a:noFill/>
+                    </a:lnTlToBr>
+                    <a:lnBlToTr>
+                      <a:noFill/>
+                    </a:lnBlToTr>
+                    <a:noFill/>
+                  </a:tcPr>
+                </a:tc>
+                <a:tc>
+                  <a:txBody>
+                    <a:bodyPr/>
+                    <a:lstStyle/>
+                    <a:p>
+                      <a:pPr marL="0" marR="0" lvl="0" indent="0" algn="ctr" defTabSz="914400" rtl="0" eaLnBrk="1" fontAlgn="base" latinLnBrk="0" hangingPunct="1">
+                        <a:lnSpc>
+                          <a:spcPct val="100000"/>
+                        </a:lnSpc>
+                        <a:spcBef>
+                          <a:spcPct val="0"/>
+                        </a:spcBef>
+                        <a:spcAft>
+                          <a:spcPct val="0"/>
+                        </a:spcAft>
+                        <a:buClrTx/>
+                        <a:buSzTx/>
+                        <a:buFontTx/>
+                        <a:buNone/>
+                        <a:tabLst/>
+                      </a:pPr>
+                      <a:r>
+                        <a:rPr kumimoji="0" lang="fr-FR" sz="1200" b="1" i="0" u="sng" strike="noStrike" cap="none" normalizeH="0" baseline="0" dirty="0" smtClean="0">
+                          <a:ln>
+                            <a:noFill/>
+                          </a:ln>
+                          <a:solidFill>
+                            <a:schemeClr val="tx1"/>
+                          </a:solidFill>
+                          <a:effectLst/>
+                          <a:latin typeface="Calibri" pitchFamily="34" charset="0"/>
+                          <a:cs typeface="Arial" charset="0"/>
+                        </a:rPr>
+                        <a:t>Not </a:t>
+                      </a:r>
+                      <a:r>
+                        <a:rPr kumimoji="0" lang="fr-FR" sz="1200" b="1" i="0" u="sng" strike="noStrike" cap="none" normalizeH="0" baseline="0" dirty="0" err="1" smtClean="0">
+                          <a:ln>
+                            <a:noFill/>
+                          </a:ln>
+                          <a:solidFill>
+                            <a:schemeClr val="tx1"/>
+                          </a:solidFill>
+                          <a:effectLst/>
+                          <a:latin typeface="Calibri" pitchFamily="34" charset="0"/>
+                          <a:cs typeface="Arial" charset="0"/>
+                        </a:rPr>
+                        <a:t>Used</a:t>
+                      </a:r>
+                      <a:endParaRPr kumimoji="0" lang="fr-FR" sz="1200" b="1" i="0" u="sng" strike="noStrike" cap="none" normalizeH="0" baseline="0" dirty="0" smtClean="0">
+                        <a:ln>
+                          <a:noFill/>
+                        </a:ln>
+                        <a:solidFill>
+                          <a:schemeClr val="tx1"/>
+                        </a:solidFill>
+                        <a:effectLst/>
+                        <a:latin typeface="Calibri" pitchFamily="34" charset="0"/>
+                        <a:cs typeface="Arial" charset="0"/>
+                      </a:endParaRPr>
+                    </a:p>
+                    <a:p>
+                      <a:pPr marL="0" marR="0" lvl="0" indent="0" algn="l" defTabSz="914400" rtl="0" eaLnBrk="1" fontAlgn="base" latinLnBrk="0" hangingPunct="1">
+                        <a:lnSpc>
+                          <a:spcPct val="100000"/>
+                        </a:lnSpc>
+                        <a:spcBef>
+                          <a:spcPct val="0"/>
+                        </a:spcBef>
+                        <a:spcAft>
+                          <a:spcPct val="0"/>
+                        </a:spcAft>
+                        <a:buClrTx/>
+                        <a:buSzTx/>
+                        <a:buFontTx/>
+                        <a:buNone/>
+                        <a:tabLst/>
+                      </a:pPr>
+                      <a:r>
+                        <a:rPr kumimoji="0" lang="fr-FR" sz="900" b="0" i="0" u="none" strike="noStrike" cap="none" normalizeH="0" baseline="0" dirty="0" smtClean="0">
+                          <a:ln>
+                            <a:noFill/>
+                          </a:ln>
+                          <a:solidFill>
+                            <a:srgbClr val="000000"/>
+                          </a:solidFill>
+                          <a:effectLst/>
+                          <a:latin typeface="Calibri" pitchFamily="34" charset="0"/>
+                          <a:cs typeface="Arial" charset="0"/>
+                        </a:rPr>
+                        <a:t>24 </a:t>
+                      </a:r>
+                      <a:r>
+                        <a:rPr kumimoji="0" lang="fr-FR" sz="900" b="0" i="0" u="none" strike="noStrike" cap="none" normalizeH="0" baseline="0" dirty="0" smtClean="0">
+                          <a:ln>
+                            <a:noFill/>
+                          </a:ln>
+                          <a:solidFill>
+                            <a:srgbClr val="000000"/>
+                          </a:solidFill>
+                          <a:effectLst/>
+                          <a:latin typeface="Calibri" pitchFamily="34" charset="0"/>
+                          <a:cs typeface="Arial" charset="0"/>
+                        </a:rPr>
+                        <a:t>-</a:t>
+                      </a:r>
+                      <a:endParaRPr kumimoji="0" lang="fr-FR" sz="900" b="0" i="0" u="none" strike="noStrike" cap="none" normalizeH="0" baseline="0" dirty="0" smtClean="0">
+                        <a:ln>
+                          <a:noFill/>
+                        </a:ln>
+                        <a:solidFill>
+                          <a:srgbClr val="000000"/>
+                        </a:solidFill>
+                        <a:effectLst/>
+                        <a:latin typeface="Calibri" pitchFamily="34" charset="0"/>
+                        <a:cs typeface="Arial" charset="0"/>
+                      </a:endParaRPr>
+                    </a:p>
+                    <a:p>
+                      <a:pPr marL="0" marR="0" lvl="0" indent="0" algn="l" defTabSz="914400" rtl="0" eaLnBrk="1" fontAlgn="base" latinLnBrk="0" hangingPunct="1">
+                        <a:lnSpc>
+                          <a:spcPct val="100000"/>
+                        </a:lnSpc>
+                        <a:spcBef>
+                          <a:spcPct val="0"/>
+                        </a:spcBef>
+                        <a:spcAft>
+                          <a:spcPct val="0"/>
+                        </a:spcAft>
+                        <a:buClrTx/>
+                        <a:buSzTx/>
+                        <a:buFontTx/>
+                        <a:buNone/>
+                        <a:tabLst/>
+                      </a:pPr>
+                      <a:r>
+                        <a:rPr kumimoji="0" lang="fr-FR" sz="900" b="0" i="0" u="none" strike="noStrike" cap="none" normalizeH="0" baseline="0" dirty="0" smtClean="0">
+                          <a:ln>
+                            <a:noFill/>
+                          </a:ln>
+                          <a:solidFill>
+                            <a:srgbClr val="000000"/>
+                          </a:solidFill>
+                          <a:effectLst/>
+                          <a:latin typeface="Calibri" pitchFamily="34" charset="0"/>
+                          <a:cs typeface="Arial" charset="0"/>
+                        </a:rPr>
+                        <a:t>25 </a:t>
+                      </a:r>
+                      <a:r>
+                        <a:rPr kumimoji="0" lang="fr-FR" sz="900" b="0" i="0" u="none" strike="noStrike" cap="none" normalizeH="0" baseline="0" dirty="0" smtClean="0">
+                          <a:ln>
+                            <a:noFill/>
+                          </a:ln>
+                          <a:solidFill>
+                            <a:srgbClr val="000000"/>
+                          </a:solidFill>
+                          <a:effectLst/>
+                          <a:latin typeface="Calibri" pitchFamily="34" charset="0"/>
+                          <a:cs typeface="Arial" charset="0"/>
+                        </a:rPr>
+                        <a:t>-</a:t>
+                      </a:r>
+                      <a:endParaRPr kumimoji="0" lang="fr-FR" sz="900" b="0" i="0" u="none" strike="noStrike" cap="none" normalizeH="0" baseline="0" dirty="0" smtClean="0">
+                        <a:ln>
+                          <a:noFill/>
+                        </a:ln>
+                        <a:solidFill>
+                          <a:srgbClr val="000000"/>
+                        </a:solidFill>
+                        <a:effectLst/>
+                        <a:latin typeface="Calibri" pitchFamily="34" charset="0"/>
+                        <a:cs typeface="Arial" charset="0"/>
+                      </a:endParaRPr>
+                    </a:p>
+                    <a:p>
+                      <a:pPr marL="0" marR="0" lvl="0" indent="0" algn="l" defTabSz="914400" rtl="0" eaLnBrk="1" fontAlgn="base" latinLnBrk="0" hangingPunct="1">
+                        <a:lnSpc>
+                          <a:spcPct val="100000"/>
+                        </a:lnSpc>
+                        <a:spcBef>
+                          <a:spcPct val="0"/>
+                        </a:spcBef>
+                        <a:spcAft>
+                          <a:spcPct val="0"/>
+                        </a:spcAft>
+                        <a:buClrTx/>
+                        <a:buSzTx/>
+                        <a:buFontTx/>
+                        <a:buNone/>
+                        <a:tabLst/>
+                      </a:pPr>
+                      <a:r>
+                        <a:rPr kumimoji="0" lang="fr-FR" sz="900" b="0" i="0" u="none" strike="noStrike" cap="none" normalizeH="0" baseline="0" dirty="0" smtClean="0">
+                          <a:ln>
+                            <a:noFill/>
+                          </a:ln>
+                          <a:solidFill>
+                            <a:srgbClr val="000000"/>
+                          </a:solidFill>
+                          <a:effectLst/>
+                          <a:latin typeface="Calibri" pitchFamily="34" charset="0"/>
+                          <a:cs typeface="Arial" charset="0"/>
+                        </a:rPr>
+                        <a:t>26 </a:t>
+                      </a:r>
+                      <a:r>
+                        <a:rPr kumimoji="0" lang="fr-FR" sz="900" b="0" i="0" u="none" strike="noStrike" cap="none" normalizeH="0" baseline="0" dirty="0" smtClean="0">
+                          <a:ln>
+                            <a:noFill/>
+                          </a:ln>
+                          <a:solidFill>
+                            <a:srgbClr val="000000"/>
+                          </a:solidFill>
+                          <a:effectLst/>
+                          <a:latin typeface="Calibri" pitchFamily="34" charset="0"/>
+                          <a:cs typeface="Arial" charset="0"/>
+                        </a:rPr>
+                        <a:t>-</a:t>
+                      </a:r>
+                      <a:endParaRPr kumimoji="0" lang="fr-FR" sz="900" b="0" i="0" u="none" strike="noStrike" cap="none" normalizeH="0" baseline="0" dirty="0" smtClean="0">
+                        <a:ln>
+                          <a:noFill/>
+                        </a:ln>
+                        <a:solidFill>
+                          <a:srgbClr val="000000"/>
+                        </a:solidFill>
+                        <a:effectLst/>
+                        <a:latin typeface="Calibri" pitchFamily="34" charset="0"/>
+                        <a:cs typeface="Arial" charset="0"/>
+                      </a:endParaRPr>
+                    </a:p>
+                    <a:p>
+                      <a:pPr marL="0" marR="0" lvl="0" indent="0" algn="l" defTabSz="914400" rtl="0" eaLnBrk="1" fontAlgn="base" latinLnBrk="0" hangingPunct="1">
+                        <a:lnSpc>
+                          <a:spcPct val="100000"/>
+                        </a:lnSpc>
+                        <a:spcBef>
+                          <a:spcPct val="0"/>
+                        </a:spcBef>
+                        <a:spcAft>
+                          <a:spcPct val="0"/>
+                        </a:spcAft>
+                        <a:buClrTx/>
+                        <a:buSzTx/>
+                        <a:buFontTx/>
+                        <a:buNone/>
+                        <a:tabLst/>
+                      </a:pPr>
+                      <a:r>
+                        <a:rPr kumimoji="0" lang="fr-FR" sz="900" b="0" i="0" u="none" strike="noStrike" cap="none" normalizeH="0" baseline="0" dirty="0" smtClean="0">
+                          <a:ln>
+                            <a:noFill/>
+                          </a:ln>
+                          <a:solidFill>
+                            <a:srgbClr val="000000"/>
+                          </a:solidFill>
+                          <a:effectLst/>
+                          <a:latin typeface="Calibri" pitchFamily="34" charset="0"/>
+                          <a:cs typeface="Arial" charset="0"/>
+                        </a:rPr>
+                        <a:t>27 </a:t>
+                      </a:r>
+                      <a:r>
+                        <a:rPr kumimoji="0" lang="fr-FR" sz="900" b="0" i="0" u="none" strike="noStrike" cap="none" normalizeH="0" baseline="0" dirty="0" smtClean="0">
+                          <a:ln>
+                            <a:noFill/>
+                          </a:ln>
+                          <a:solidFill>
+                            <a:srgbClr val="000000"/>
+                          </a:solidFill>
+                          <a:effectLst/>
+                          <a:latin typeface="Calibri" pitchFamily="34" charset="0"/>
+                          <a:cs typeface="Arial" charset="0"/>
+                        </a:rPr>
+                        <a:t>-</a:t>
+                      </a:r>
+                      <a:endParaRPr kumimoji="0" lang="fr-FR" sz="900" b="0" i="0" u="none" strike="noStrike" cap="none" normalizeH="0" baseline="0" dirty="0" smtClean="0">
+                        <a:ln>
+                          <a:noFill/>
+                        </a:ln>
+                        <a:solidFill>
+                          <a:srgbClr val="000000"/>
+                        </a:solidFill>
+                        <a:effectLst/>
+                        <a:latin typeface="Calibri" pitchFamily="34" charset="0"/>
+                        <a:cs typeface="Arial" charset="0"/>
+                      </a:endParaRPr>
+                    </a:p>
+                    <a:p>
+                      <a:pPr marL="0" marR="0" lvl="0" indent="0" algn="l" defTabSz="914400" rtl="0" eaLnBrk="1" fontAlgn="base" latinLnBrk="0" hangingPunct="1">
+                        <a:lnSpc>
+                          <a:spcPct val="100000"/>
+                        </a:lnSpc>
+                        <a:spcBef>
+                          <a:spcPct val="0"/>
+                        </a:spcBef>
+                        <a:spcAft>
+                          <a:spcPct val="0"/>
+                        </a:spcAft>
+                        <a:buClrTx/>
+                        <a:buSzTx/>
+                        <a:buFontTx/>
+                        <a:buNone/>
+                        <a:tabLst/>
+                      </a:pPr>
+                      <a:r>
+                        <a:rPr kumimoji="0" lang="fr-FR" sz="900" b="0" i="0" u="none" strike="noStrike" cap="none" normalizeH="0" baseline="0" dirty="0" smtClean="0">
+                          <a:ln>
+                            <a:noFill/>
+                          </a:ln>
+                          <a:solidFill>
+                            <a:srgbClr val="000000"/>
+                          </a:solidFill>
+                          <a:effectLst/>
+                          <a:latin typeface="Calibri" pitchFamily="34" charset="0"/>
+                          <a:cs typeface="Arial" charset="0"/>
+                        </a:rPr>
+                        <a:t>28 </a:t>
+                      </a:r>
+                      <a:r>
+                        <a:rPr kumimoji="0" lang="fr-FR" sz="900" b="0" i="0" u="none" strike="noStrike" cap="none" normalizeH="0" baseline="0" dirty="0" smtClean="0">
+                          <a:ln>
+                            <a:noFill/>
+                          </a:ln>
+                          <a:solidFill>
+                            <a:srgbClr val="000000"/>
+                          </a:solidFill>
+                          <a:effectLst/>
+                          <a:latin typeface="Calibri" pitchFamily="34" charset="0"/>
+                          <a:cs typeface="Arial" charset="0"/>
+                        </a:rPr>
+                        <a:t>-</a:t>
+                      </a:r>
+                      <a:endParaRPr kumimoji="0" lang="fr-FR" sz="900" b="0" i="0" u="none" strike="noStrike" cap="none" normalizeH="0" baseline="0" dirty="0" smtClean="0">
+                        <a:ln>
+                          <a:noFill/>
+                        </a:ln>
+                        <a:solidFill>
+                          <a:srgbClr val="000000"/>
+                        </a:solidFill>
+                        <a:effectLst/>
+                        <a:latin typeface="Calibri" pitchFamily="34" charset="0"/>
+                        <a:cs typeface="Arial" charset="0"/>
+                      </a:endParaRPr>
+                    </a:p>
+                    <a:p>
+                      <a:pPr marL="0" marR="0" lvl="0" indent="0" algn="l" defTabSz="914400" rtl="0" eaLnBrk="1" fontAlgn="base" latinLnBrk="0" hangingPunct="1">
+                        <a:lnSpc>
+                          <a:spcPct val="100000"/>
+                        </a:lnSpc>
+                        <a:spcBef>
+                          <a:spcPct val="0"/>
+                        </a:spcBef>
+                        <a:spcAft>
+                          <a:spcPct val="0"/>
+                        </a:spcAft>
+                        <a:buClrTx/>
+                        <a:buSzTx/>
+                        <a:buFontTx/>
+                        <a:buNone/>
+                        <a:tabLst/>
+                      </a:pPr>
+                      <a:r>
+                        <a:rPr kumimoji="0" lang="fr-FR" sz="900" b="0" i="0" u="none" strike="noStrike" cap="none" normalizeH="0" baseline="0" dirty="0" smtClean="0">
+                          <a:ln>
+                            <a:noFill/>
+                          </a:ln>
+                          <a:solidFill>
+                            <a:srgbClr val="000000"/>
+                          </a:solidFill>
+                          <a:effectLst/>
+                          <a:latin typeface="Calibri" pitchFamily="34" charset="0"/>
+                          <a:cs typeface="Arial" charset="0"/>
+                        </a:rPr>
+                        <a:t>29 </a:t>
+                      </a:r>
+                      <a:r>
+                        <a:rPr kumimoji="0" lang="fr-FR" sz="900" b="0" i="0" u="none" strike="noStrike" cap="none" normalizeH="0" baseline="0" dirty="0" smtClean="0">
+                          <a:ln>
+                            <a:noFill/>
+                          </a:ln>
+                          <a:solidFill>
+                            <a:srgbClr val="000000"/>
+                          </a:solidFill>
+                          <a:effectLst/>
+                          <a:latin typeface="Calibri" pitchFamily="34" charset="0"/>
+                          <a:cs typeface="Arial" charset="0"/>
+                        </a:rPr>
+                        <a:t>-</a:t>
+                      </a:r>
+                      <a:endParaRPr kumimoji="0" lang="fr-FR" sz="900" b="0" i="0" u="none" strike="noStrike" cap="none" normalizeH="0" baseline="0" dirty="0" smtClean="0">
+                        <a:ln>
+                          <a:noFill/>
+                        </a:ln>
+                        <a:solidFill>
+                          <a:srgbClr val="000000"/>
+                        </a:solidFill>
+                        <a:effectLst/>
+                        <a:latin typeface="Calibri" pitchFamily="34" charset="0"/>
+                        <a:cs typeface="Arial" charset="0"/>
+                      </a:endParaRPr>
+                    </a:p>
+                    <a:p>
+                      <a:pPr marL="0" marR="0" lvl="0" indent="0" algn="l" defTabSz="914400" rtl="0" eaLnBrk="1" fontAlgn="base" latinLnBrk="0" hangingPunct="1">
+                        <a:lnSpc>
+                          <a:spcPct val="100000"/>
+                        </a:lnSpc>
+                        <a:spcBef>
+                          <a:spcPct val="0"/>
+                        </a:spcBef>
+                        <a:spcAft>
+                          <a:spcPct val="0"/>
+                        </a:spcAft>
+                        <a:buClrTx/>
+                        <a:buSzTx/>
+                        <a:buFontTx/>
+                        <a:buNone/>
+                        <a:tabLst/>
+                      </a:pPr>
+                      <a:r>
+                        <a:rPr kumimoji="0" lang="fr-FR" sz="900" b="0" i="0" u="none" strike="noStrike" cap="none" normalizeH="0" baseline="0" dirty="0" smtClean="0">
+                          <a:ln>
+                            <a:noFill/>
+                          </a:ln>
+                          <a:solidFill>
+                            <a:srgbClr val="000000"/>
+                          </a:solidFill>
+                          <a:effectLst/>
+                          <a:latin typeface="Calibri" pitchFamily="34" charset="0"/>
+                          <a:cs typeface="Arial" charset="0"/>
+                        </a:rPr>
+                        <a:t>30 </a:t>
+                      </a:r>
+                      <a:r>
+                        <a:rPr kumimoji="0" lang="fr-FR" sz="900" b="0" i="0" u="none" strike="noStrike" cap="none" normalizeH="0" baseline="0" dirty="0" smtClean="0">
+                          <a:ln>
+                            <a:noFill/>
+                          </a:ln>
+                          <a:solidFill>
+                            <a:srgbClr val="000000"/>
+                          </a:solidFill>
+                          <a:effectLst/>
+                          <a:latin typeface="Calibri" pitchFamily="34" charset="0"/>
+                          <a:cs typeface="Arial" charset="0"/>
+                        </a:rPr>
+                        <a:t>-</a:t>
+                      </a:r>
+                      <a:endParaRPr kumimoji="0" lang="fr-FR" sz="900" b="0" i="0" u="none" strike="noStrike" cap="none" normalizeH="0" baseline="0" dirty="0" smtClean="0">
+                        <a:ln>
+                          <a:noFill/>
+                        </a:ln>
+                        <a:solidFill>
+                          <a:srgbClr val="000000"/>
+                        </a:solidFill>
+                        <a:effectLst/>
+                        <a:latin typeface="Calibri" pitchFamily="34" charset="0"/>
+                        <a:cs typeface="Arial" charset="0"/>
+                      </a:endParaRPr>
+                    </a:p>
+                    <a:p>
+                      <a:pPr marL="0" marR="0" lvl="0" indent="0" algn="l" defTabSz="914400" rtl="0" eaLnBrk="1" fontAlgn="base" latinLnBrk="0" hangingPunct="1">
+                        <a:lnSpc>
+                          <a:spcPct val="100000"/>
+                        </a:lnSpc>
+                        <a:spcBef>
+                          <a:spcPct val="0"/>
+                        </a:spcBef>
+                        <a:spcAft>
+                          <a:spcPct val="0"/>
+                        </a:spcAft>
+                        <a:buClrTx/>
+                        <a:buSzTx/>
+                        <a:buFontTx/>
+                        <a:buNone/>
+                        <a:tabLst/>
+                      </a:pPr>
+                      <a:r>
+                        <a:rPr kumimoji="0" lang="fr-FR" sz="900" b="0" i="0" u="none" strike="noStrike" cap="none" normalizeH="0" baseline="0" dirty="0" smtClean="0">
+                          <a:ln>
+                            <a:noFill/>
+                          </a:ln>
+                          <a:solidFill>
+                            <a:srgbClr val="000000"/>
+                          </a:solidFill>
+                          <a:effectLst/>
+                          <a:latin typeface="Calibri" pitchFamily="34" charset="0"/>
+                          <a:cs typeface="Arial" charset="0"/>
+                        </a:rPr>
+                        <a:t>31 -</a:t>
+                      </a:r>
+                      <a:endParaRPr kumimoji="0" lang="fr-FR" sz="1200" b="1" i="0" u="sng" strike="noStrike" cap="none" normalizeH="0" baseline="0" dirty="0" smtClean="0">
+                        <a:ln>
+                          <a:noFill/>
+                        </a:ln>
+                        <a:solidFill>
+                          <a:schemeClr val="tx1"/>
+                        </a:solidFill>
+                        <a:effectLst/>
+                        <a:latin typeface="Calibri" pitchFamily="34" charset="0"/>
+                        <a:cs typeface="Arial" charset="0"/>
+                      </a:endParaRPr>
+                    </a:p>
+                  </a:txBody>
+                  <a:tcPr horzOverflow="overflow">
+                    <a:lnL w="12700" cap="flat" cmpd="sng" algn="ctr">
+                      <a:solidFill>
+                        <a:schemeClr val="tx1"/>
+                      </a:solidFill>
+                      <a:prstDash val="solid"/>
+                      <a:round/>
+                      <a:headEnd type="none" w="med" len="med"/>
+                      <a:tailEnd type="none" w="med" len="med"/>
+                    </a:lnL>
+                    <a:lnR w="12700" cap="flat" cmpd="sng" algn="ctr">
+                      <a:solidFill>
+                        <a:schemeClr val="tx1"/>
+                      </a:solidFill>
+                      <a:prstDash val="solid"/>
+                      <a:round/>
+                      <a:headEnd type="none" w="med" len="med"/>
+                      <a:tailEnd type="none" w="med" len="med"/>
+                    </a:lnR>
+                    <a:lnT w="12700" cap="flat" cmpd="sng" algn="ctr">
+                      <a:solidFill>
+                        <a:schemeClr val="tx1"/>
+                      </a:solidFill>
+                      <a:prstDash val="solid"/>
+                      <a:round/>
+                      <a:headEnd type="none" w="med" len="med"/>
+                      <a:tailEnd type="none" w="med" len="med"/>
+                    </a:lnT>
+                    <a:lnB w="12700" cap="flat" cmpd="sng" algn="ctr">
+                      <a:solidFill>
+                        <a:schemeClr val="tx1"/>
+                      </a:solidFill>
+                      <a:prstDash val="solid"/>
+                      <a:round/>
+                      <a:headEnd type="none" w="med" len="med"/>
+                      <a:tailEnd type="none" w="med" len="med"/>
+                    </a:lnB>
+                    <a:lnTlToBr>
+                      <a:noFill/>
+                    </a:lnTlToBr>
+                    <a:lnBlToTr>
+                      <a:noFill/>
+                    </a:lnBlToTr>
+                    <a:noFill/>
+                  </a:tcPr>
+                </a:tc>
+              </a:tr>
+            </a:tbl>
+          </a:graphicData>
+        </a:graphic>
+      </p:graphicFrame>
+    </p:spTree>
+    <p:extLst>
+      <p:ext uri="{BB962C8B-B14F-4D97-AF65-F5344CB8AC3E}">
+        <p14:creationId xmlns:p14="http://schemas.microsoft.com/office/powerpoint/2010/main" val="3497095390"/>
+      </p:ext>
+    </p:extLst>
   </p:cSld>
   <p:clrMapOvr>
     <a:masterClrMapping/>

</xml_diff>